<commit_message>
added a page with all units in same exponent(GHz, mV, fW, mK)
</commit_message>
<xml_diff>
--- a/triangle.pptx
+++ b/triangle.pptx
@@ -6,6 +6,7 @@
   </p:sldMasterIdLst>
   <p:sldIdLst>
     <p:sldId id="259" r:id="rId2"/>
+    <p:sldId id="260" r:id="rId3"/>
   </p:sldIdLst>
   <p:sldSz cx="10058400" cy="7772400"/>
   <p:notesSz cx="7023100" cy="9309100"/>
@@ -3006,8 +3007,8 @@
           </a:prstGeom>
         </p:spPr>
       </p:pic>
-      <mc:AlternateContent xmlns:mc="http://schemas.openxmlformats.org/markup-compatibility/2006">
-        <mc:Choice xmlns:a14="http://schemas.microsoft.com/office/drawing/2010/main" Requires="a14">
+      <mc:AlternateContent xmlns:mc="http://schemas.openxmlformats.org/markup-compatibility/2006" xmlns:a14="http://schemas.microsoft.com/office/drawing/2010/main">
+        <mc:Choice Requires="a14">
           <p:sp>
             <p:nvSpPr>
               <p:cNvPr id="18" name="Rectangle: Rounded Corners 17">
@@ -3145,7 +3146,7 @@
             </p:txBody>
           </p:sp>
         </mc:Choice>
-        <mc:Fallback>
+        <mc:Fallback xmlns="">
           <p:sp>
             <p:nvSpPr>
               <p:cNvPr id="18" name="Rectangle: Rounded Corners 17">
@@ -3190,8 +3191,8 @@
           </p:sp>
         </mc:Fallback>
       </mc:AlternateContent>
-      <mc:AlternateContent xmlns:mc="http://schemas.openxmlformats.org/markup-compatibility/2006">
-        <mc:Choice xmlns:a14="http://schemas.microsoft.com/office/drawing/2010/main" Requires="a14">
+      <mc:AlternateContent xmlns:mc="http://schemas.openxmlformats.org/markup-compatibility/2006" xmlns:a14="http://schemas.microsoft.com/office/drawing/2010/main">
+        <mc:Choice Requires="a14">
           <p:sp>
             <p:nvSpPr>
               <p:cNvPr id="21" name="Rectangle: Rounded Corners 20">
@@ -3352,7 +3353,7 @@
             </p:txBody>
           </p:sp>
         </mc:Choice>
-        <mc:Fallback>
+        <mc:Fallback xmlns="">
           <p:sp>
             <p:nvSpPr>
               <p:cNvPr id="21" name="Rectangle: Rounded Corners 20">
@@ -3397,8 +3398,8 @@
           </p:sp>
         </mc:Fallback>
       </mc:AlternateContent>
-      <mc:AlternateContent xmlns:mc="http://schemas.openxmlformats.org/markup-compatibility/2006">
-        <mc:Choice xmlns:a14="http://schemas.microsoft.com/office/drawing/2010/main" Requires="a14">
+      <mc:AlternateContent xmlns:mc="http://schemas.openxmlformats.org/markup-compatibility/2006" xmlns:a14="http://schemas.microsoft.com/office/drawing/2010/main">
+        <mc:Choice Requires="a14">
           <p:sp>
             <p:nvSpPr>
               <p:cNvPr id="23" name="Rectangle: Rounded Corners 22">
@@ -3704,7 +3705,7 @@
             </p:txBody>
           </p:sp>
         </mc:Choice>
-        <mc:Fallback>
+        <mc:Fallback xmlns="">
           <p:sp>
             <p:nvSpPr>
               <p:cNvPr id="23" name="Rectangle: Rounded Corners 22">
@@ -3749,8 +3750,8 @@
           </p:sp>
         </mc:Fallback>
       </mc:AlternateContent>
-      <mc:AlternateContent xmlns:mc="http://schemas.openxmlformats.org/markup-compatibility/2006">
-        <mc:Choice xmlns:a14="http://schemas.microsoft.com/office/drawing/2010/main" Requires="a14">
+      <mc:AlternateContent xmlns:mc="http://schemas.openxmlformats.org/markup-compatibility/2006" xmlns:a14="http://schemas.microsoft.com/office/drawing/2010/main">
+        <mc:Choice Requires="a14">
           <p:sp>
             <p:nvSpPr>
               <p:cNvPr id="27" name="Rectangle: Rounded Corners 26">
@@ -3925,7 +3926,7 @@
             </p:txBody>
           </p:sp>
         </mc:Choice>
-        <mc:Fallback>
+        <mc:Fallback xmlns="">
           <p:sp>
             <p:nvSpPr>
               <p:cNvPr id="27" name="Rectangle: Rounded Corners 26">
@@ -3970,8 +3971,8 @@
           </p:sp>
         </mc:Fallback>
       </mc:AlternateContent>
-      <mc:AlternateContent xmlns:mc="http://schemas.openxmlformats.org/markup-compatibility/2006">
-        <mc:Choice xmlns:a14="http://schemas.microsoft.com/office/drawing/2010/main" Requires="a14">
+      <mc:AlternateContent xmlns:mc="http://schemas.openxmlformats.org/markup-compatibility/2006" xmlns:a14="http://schemas.microsoft.com/office/drawing/2010/main">
+        <mc:Choice Requires="a14">
           <p:sp>
             <p:nvSpPr>
               <p:cNvPr id="28" name="Rectangle: Rounded Corners 27">
@@ -4132,7 +4133,7 @@
             </p:txBody>
           </p:sp>
         </mc:Choice>
-        <mc:Fallback>
+        <mc:Fallback xmlns="">
           <p:sp>
             <p:nvSpPr>
               <p:cNvPr id="28" name="Rectangle: Rounded Corners 27">
@@ -4177,8 +4178,8 @@
           </p:sp>
         </mc:Fallback>
       </mc:AlternateContent>
-      <mc:AlternateContent xmlns:mc="http://schemas.openxmlformats.org/markup-compatibility/2006">
-        <mc:Choice xmlns:a14="http://schemas.microsoft.com/office/drawing/2010/main" Requires="a14">
+      <mc:AlternateContent xmlns:mc="http://schemas.openxmlformats.org/markup-compatibility/2006" xmlns:a14="http://schemas.microsoft.com/office/drawing/2010/main">
+        <mc:Choice Requires="a14">
           <p:sp>
             <p:nvSpPr>
               <p:cNvPr id="4" name="Rectangle: Rounded Corners 3">
@@ -4319,7 +4320,7 @@
             </p:txBody>
           </p:sp>
         </mc:Choice>
-        <mc:Fallback>
+        <mc:Fallback xmlns="">
           <p:sp>
             <p:nvSpPr>
               <p:cNvPr id="4" name="Rectangle: Rounded Corners 3">
@@ -4364,8 +4365,8 @@
           </p:sp>
         </mc:Fallback>
       </mc:AlternateContent>
-      <mc:AlternateContent xmlns:mc="http://schemas.openxmlformats.org/markup-compatibility/2006">
-        <mc:Choice xmlns:a14="http://schemas.microsoft.com/office/drawing/2010/main" Requires="a14">
+      <mc:AlternateContent xmlns:mc="http://schemas.openxmlformats.org/markup-compatibility/2006" xmlns:a14="http://schemas.microsoft.com/office/drawing/2010/main">
+        <mc:Choice Requires="a14">
           <p:sp>
             <p:nvSpPr>
               <p:cNvPr id="9" name="Rectangle: Rounded Corners 8">
@@ -4559,7 +4560,7 @@
             </p:txBody>
           </p:sp>
         </mc:Choice>
-        <mc:Fallback>
+        <mc:Fallback xmlns="">
           <p:sp>
             <p:nvSpPr>
               <p:cNvPr id="9" name="Rectangle: Rounded Corners 8">
@@ -4604,8 +4605,8 @@
           </p:sp>
         </mc:Fallback>
       </mc:AlternateContent>
-      <mc:AlternateContent xmlns:mc="http://schemas.openxmlformats.org/markup-compatibility/2006">
-        <mc:Choice xmlns:a14="http://schemas.microsoft.com/office/drawing/2010/main" Requires="a14">
+      <mc:AlternateContent xmlns:mc="http://schemas.openxmlformats.org/markup-compatibility/2006" xmlns:a14="http://schemas.microsoft.com/office/drawing/2010/main">
+        <mc:Choice Requires="a14">
           <p:sp>
             <p:nvSpPr>
               <p:cNvPr id="10" name="Rectangle: Rounded Corners 9">
@@ -4818,7 +4819,7 @@
             </p:txBody>
           </p:sp>
         </mc:Choice>
-        <mc:Fallback>
+        <mc:Fallback xmlns="">
           <p:sp>
             <p:nvSpPr>
               <p:cNvPr id="10" name="Rectangle: Rounded Corners 9">
@@ -5011,6 +5012,2556 @@
     <p:extLst>
       <p:ext uri="{BB962C8B-B14F-4D97-AF65-F5344CB8AC3E}">
         <p14:creationId xmlns:p14="http://schemas.microsoft.com/office/powerpoint/2010/main" val="2002482177"/>
+      </p:ext>
+    </p:extLst>
+  </p:cSld>
+  <p:clrMapOvr>
+    <a:masterClrMapping/>
+  </p:clrMapOvr>
+</p:sld>
+</file>
+
+<file path=ppt/slides/slide2.xml><?xml version="1.0" encoding="utf-8"?>
+<p:sld xmlns:a="http://schemas.openxmlformats.org/drawingml/2006/main" xmlns:r="http://schemas.openxmlformats.org/officeDocument/2006/relationships" xmlns:p="http://schemas.openxmlformats.org/presentationml/2006/main">
+  <p:cSld>
+    <p:spTree>
+      <p:nvGrpSpPr>
+        <p:cNvPr id="1" name=""/>
+        <p:cNvGrpSpPr/>
+        <p:nvPr/>
+      </p:nvGrpSpPr>
+      <p:grpSpPr>
+        <a:xfrm>
+          <a:off x="0" y="0"/>
+          <a:ext cx="0" cy="0"/>
+          <a:chOff x="0" y="0"/>
+          <a:chExt cx="0" cy="0"/>
+        </a:xfrm>
+      </p:grpSpPr>
+      <p:pic>
+        <p:nvPicPr>
+          <p:cNvPr id="3" name="Picture 2" descr="Shape&#10;&#10;Description automatically generated with low confidence">
+            <a:extLst>
+              <a:ext uri="{FF2B5EF4-FFF2-40B4-BE49-F238E27FC236}">
+                <a16:creationId xmlns:a16="http://schemas.microsoft.com/office/drawing/2014/main" id="{BA322A11-A1DF-F756-790D-064C1809E2D7}"/>
+              </a:ext>
+            </a:extLst>
+          </p:cNvPr>
+          <p:cNvPicPr>
+            <a:picLocks noChangeAspect="1"/>
+          </p:cNvPicPr>
+          <p:nvPr/>
+        </p:nvPicPr>
+        <p:blipFill rotWithShape="1">
+          <a:blip r:embed="rId2">
+            <a:extLst>
+              <a:ext uri="{28A0092B-C50C-407E-A947-70E740481C1C}">
+                <a14:useLocalDpi xmlns:a14="http://schemas.microsoft.com/office/drawing/2010/main" val="0"/>
+              </a:ext>
+            </a:extLst>
+          </a:blip>
+          <a:srcRect b="12339"/>
+          <a:stretch/>
+        </p:blipFill>
+        <p:spPr>
+          <a:xfrm>
+            <a:off x="1813016" y="779454"/>
+            <a:ext cx="6667500" cy="5844789"/>
+          </a:xfrm>
+          <a:prstGeom prst="rect">
+            <a:avLst/>
+          </a:prstGeom>
+        </p:spPr>
+      </p:pic>
+      <mc:AlternateContent xmlns:mc="http://schemas.openxmlformats.org/markup-compatibility/2006">
+        <mc:Choice xmlns:a14="http://schemas.microsoft.com/office/drawing/2010/main" Requires="a14">
+          <p:sp>
+            <p:nvSpPr>
+              <p:cNvPr id="18" name="Rectangle: Rounded Corners 17">
+                <a:extLst>
+                  <a:ext uri="{FF2B5EF4-FFF2-40B4-BE49-F238E27FC236}">
+                    <a16:creationId xmlns:a16="http://schemas.microsoft.com/office/drawing/2014/main" id="{1C6C4520-4A5D-FB86-2AD0-56D50CCE4EDF}"/>
+                  </a:ext>
+                </a:extLst>
+              </p:cNvPr>
+              <p:cNvSpPr/>
+              <p:nvPr/>
+            </p:nvSpPr>
+            <p:spPr>
+              <a:xfrm>
+                <a:off x="1033771" y="5814942"/>
+                <a:ext cx="2514600" cy="914400"/>
+              </a:xfrm>
+              <a:prstGeom prst="roundRect">
+                <a:avLst/>
+              </a:prstGeom>
+              <a:solidFill>
+                <a:srgbClr val="FF6161"/>
+              </a:solidFill>
+            </p:spPr>
+            <p:style>
+              <a:lnRef idx="2">
+                <a:schemeClr val="accent1">
+                  <a:shade val="15000"/>
+                </a:schemeClr>
+              </a:lnRef>
+              <a:fillRef idx="1">
+                <a:schemeClr val="accent1"/>
+              </a:fillRef>
+              <a:effectRef idx="0">
+                <a:schemeClr val="accent1"/>
+              </a:effectRef>
+              <a:fontRef idx="minor">
+                <a:schemeClr val="lt1"/>
+              </a:fontRef>
+            </p:style>
+            <p:txBody>
+              <a:bodyPr rtlCol="0" anchor="ctr"/>
+              <a:lstStyle/>
+              <a:p>
+                <a:pPr algn="ctr"/>
+                <a14:m>
+                  <m:oMathPara xmlns:m="http://schemas.openxmlformats.org/officeDocument/2006/math">
+                    <m:oMathParaPr>
+                      <m:jc m:val="centerGroup"/>
+                    </m:oMathParaPr>
+                    <m:oMath xmlns:m="http://schemas.openxmlformats.org/officeDocument/2006/math">
+                      <m:r>
+                        <m:rPr>
+                          <m:sty m:val="p"/>
+                        </m:rPr>
+                        <a:rPr lang="en-US" sz="1400" i="1" smtClean="0">
+                          <a:solidFill>
+                            <a:schemeClr val="tx1"/>
+                          </a:solidFill>
+                          <a:latin typeface="Cambria Math" panose="02040503050406030204" pitchFamily="18" charset="0"/>
+                        </a:rPr>
+                        <m:t>e</m:t>
+                      </m:r>
+                      <m:r>
+                        <a:rPr lang="en-US" sz="1400" i="1" smtClean="0">
+                          <a:solidFill>
+                            <a:schemeClr val="tx1"/>
+                          </a:solidFill>
+                          <a:latin typeface="Cambria Math" panose="02040503050406030204" pitchFamily="18" charset="0"/>
+                        </a:rPr>
+                        <m:t>=1.6</m:t>
+                      </m:r>
+                      <m:r>
+                        <a:rPr lang="en-US" sz="1400" i="1">
+                          <a:solidFill>
+                            <a:schemeClr val="tx1"/>
+                          </a:solidFill>
+                          <a:latin typeface="Cambria Math" panose="02040503050406030204" pitchFamily="18" charset="0"/>
+                        </a:rPr>
+                        <m:t>0×</m:t>
+                      </m:r>
+                      <m:sSup>
+                        <m:sSupPr>
+                          <m:ctrlPr>
+                            <a:rPr lang="en-US" sz="1400" i="1">
+                              <a:solidFill>
+                                <a:schemeClr val="tx1"/>
+                              </a:solidFill>
+                              <a:latin typeface="Cambria Math" panose="02040503050406030204" pitchFamily="18" charset="0"/>
+                              <a:ea typeface="Cambria Math" panose="02040503050406030204" pitchFamily="18" charset="0"/>
+                            </a:rPr>
+                          </m:ctrlPr>
+                        </m:sSupPr>
+                        <m:e>
+                          <m:r>
+                            <a:rPr lang="en-US" sz="1400" i="1">
+                              <a:solidFill>
+                                <a:schemeClr val="tx1"/>
+                              </a:solidFill>
+                              <a:latin typeface="Cambria Math" panose="02040503050406030204" pitchFamily="18" charset="0"/>
+                              <a:ea typeface="Cambria Math" panose="02040503050406030204" pitchFamily="18" charset="0"/>
+                            </a:rPr>
+                            <m:t>10</m:t>
+                          </m:r>
+                        </m:e>
+                        <m:sup>
+                          <m:r>
+                            <a:rPr lang="en-US" sz="1400" b="0" i="1" smtClean="0">
+                              <a:solidFill>
+                                <a:schemeClr val="tx1"/>
+                              </a:solidFill>
+                              <a:latin typeface="Cambria Math" panose="02040503050406030204" pitchFamily="18" charset="0"/>
+                              <a:ea typeface="Cambria Math" panose="02040503050406030204" pitchFamily="18" charset="0"/>
+                            </a:rPr>
+                            <m:t>2</m:t>
+                          </m:r>
+                        </m:sup>
+                      </m:sSup>
+                      <m:f>
+                        <m:fPr>
+                          <m:ctrlPr>
+                            <a:rPr lang="en-US" sz="1400" i="1">
+                              <a:solidFill>
+                                <a:schemeClr val="tx1"/>
+                              </a:solidFill>
+                              <a:latin typeface="Cambria Math" panose="02040503050406030204" pitchFamily="18" charset="0"/>
+                            </a:rPr>
+                          </m:ctrlPr>
+                        </m:fPr>
+                        <m:num>
+                          <m:r>
+                            <a:rPr lang="en-US" sz="1400" b="0" i="1" smtClean="0">
+                              <a:solidFill>
+                                <a:schemeClr val="tx1"/>
+                              </a:solidFill>
+                              <a:latin typeface="Cambria Math" panose="02040503050406030204" pitchFamily="18" charset="0"/>
+                            </a:rPr>
+                            <m:t>𝑓</m:t>
+                          </m:r>
+                          <m:r>
+                            <a:rPr lang="en-US" sz="1400" i="1">
+                              <a:solidFill>
+                                <a:schemeClr val="tx1"/>
+                              </a:solidFill>
+                              <a:latin typeface="Cambria Math" panose="02040503050406030204" pitchFamily="18" charset="0"/>
+                            </a:rPr>
+                            <m:t>𝑊</m:t>
+                          </m:r>
+                        </m:num>
+                        <m:den>
+                          <m:r>
+                            <a:rPr lang="en-US" sz="1400" b="0" i="1" smtClean="0">
+                              <a:solidFill>
+                                <a:schemeClr val="tx1"/>
+                              </a:solidFill>
+                              <a:latin typeface="Cambria Math" panose="02040503050406030204" pitchFamily="18" charset="0"/>
+                            </a:rPr>
+                            <m:t>𝑚</m:t>
+                          </m:r>
+                          <m:r>
+                            <a:rPr lang="en-US" sz="1400" i="1">
+                              <a:solidFill>
+                                <a:schemeClr val="tx1"/>
+                              </a:solidFill>
+                              <a:latin typeface="Cambria Math" panose="02040503050406030204" pitchFamily="18" charset="0"/>
+                            </a:rPr>
+                            <m:t>𝑉</m:t>
+                          </m:r>
+                          <m:r>
+                            <a:rPr lang="en-US" sz="1400" i="1">
+                              <a:solidFill>
+                                <a:schemeClr val="tx1"/>
+                              </a:solidFill>
+                              <a:latin typeface="Cambria Math" panose="02040503050406030204" pitchFamily="18" charset="0"/>
+                              <a:ea typeface="Cambria Math" panose="02040503050406030204" pitchFamily="18" charset="0"/>
+                            </a:rPr>
+                            <m:t>∙</m:t>
+                          </m:r>
+                          <m:r>
+                            <a:rPr lang="en-US" sz="1400" i="1">
+                              <a:solidFill>
+                                <a:schemeClr val="tx1"/>
+                              </a:solidFill>
+                              <a:latin typeface="Cambria Math" panose="02040503050406030204" pitchFamily="18" charset="0"/>
+                            </a:rPr>
+                            <m:t>𝐺𝐻𝑧</m:t>
+                          </m:r>
+                        </m:den>
+                      </m:f>
+                    </m:oMath>
+                  </m:oMathPara>
+                </a14:m>
+                <a:endParaRPr lang="en-US" sz="1400" dirty="0">
+                  <a:solidFill>
+                    <a:schemeClr val="tx1"/>
+                  </a:solidFill>
+                </a:endParaRPr>
+              </a:p>
+            </p:txBody>
+          </p:sp>
+        </mc:Choice>
+        <mc:Fallback>
+          <p:sp>
+            <p:nvSpPr>
+              <p:cNvPr id="18" name="Rectangle: Rounded Corners 17">
+                <a:extLst>
+                  <a:ext uri="{FF2B5EF4-FFF2-40B4-BE49-F238E27FC236}">
+                    <a16:creationId xmlns:a16="http://schemas.microsoft.com/office/drawing/2014/main" id="{1C6C4520-4A5D-FB86-2AD0-56D50CCE4EDF}"/>
+                  </a:ext>
+                </a:extLst>
+              </p:cNvPr>
+              <p:cNvSpPr>
+                <a:spLocks noRot="1" noChangeAspect="1" noMove="1" noResize="1" noEditPoints="1" noAdjustHandles="1" noChangeArrowheads="1" noChangeShapeType="1" noTextEdit="1"/>
+              </p:cNvSpPr>
+              <p:nvPr/>
+            </p:nvSpPr>
+            <p:spPr>
+              <a:xfrm>
+                <a:off x="1033771" y="5814942"/>
+                <a:ext cx="2514600" cy="914400"/>
+              </a:xfrm>
+              <a:prstGeom prst="roundRect">
+                <a:avLst/>
+              </a:prstGeom>
+              <a:blipFill>
+                <a:blip r:embed="rId3"/>
+                <a:stretch>
+                  <a:fillRect/>
+                </a:stretch>
+              </a:blipFill>
+            </p:spPr>
+            <p:txBody>
+              <a:bodyPr/>
+              <a:lstStyle/>
+              <a:p>
+                <a:r>
+                  <a:rPr lang="en-US">
+                    <a:noFill/>
+                  </a:rPr>
+                  <a:t> </a:t>
+                </a:r>
+              </a:p>
+            </p:txBody>
+          </p:sp>
+        </mc:Fallback>
+      </mc:AlternateContent>
+      <mc:AlternateContent xmlns:mc="http://schemas.openxmlformats.org/markup-compatibility/2006">
+        <mc:Choice xmlns:a14="http://schemas.microsoft.com/office/drawing/2010/main" Requires="a14">
+          <p:sp>
+            <p:nvSpPr>
+              <p:cNvPr id="21" name="Rectangle: Rounded Corners 20">
+                <a:extLst>
+                  <a:ext uri="{FF2B5EF4-FFF2-40B4-BE49-F238E27FC236}">
+                    <a16:creationId xmlns:a16="http://schemas.microsoft.com/office/drawing/2014/main" id="{DDFAA716-2272-285C-CAC1-E4E20EB611BB}"/>
+                  </a:ext>
+                </a:extLst>
+              </p:cNvPr>
+              <p:cNvSpPr/>
+              <p:nvPr/>
+            </p:nvSpPr>
+            <p:spPr>
+              <a:xfrm>
+                <a:off x="6911673" y="5778073"/>
+                <a:ext cx="2514600" cy="914400"/>
+              </a:xfrm>
+              <a:prstGeom prst="roundRect">
+                <a:avLst/>
+              </a:prstGeom>
+              <a:solidFill>
+                <a:srgbClr val="2DC8FF"/>
+              </a:solidFill>
+            </p:spPr>
+            <p:style>
+              <a:lnRef idx="2">
+                <a:schemeClr val="accent1">
+                  <a:shade val="15000"/>
+                </a:schemeClr>
+              </a:lnRef>
+              <a:fillRef idx="1">
+                <a:schemeClr val="accent1"/>
+              </a:fillRef>
+              <a:effectRef idx="0">
+                <a:schemeClr val="accent1"/>
+              </a:effectRef>
+              <a:fontRef idx="minor">
+                <a:schemeClr val="lt1"/>
+              </a:fontRef>
+            </p:style>
+            <p:txBody>
+              <a:bodyPr rtlCol="0" anchor="ctr"/>
+              <a:lstStyle/>
+              <a:p>
+                <a:pPr algn="ctr"/>
+                <a14:m>
+                  <m:oMathPara xmlns:m="http://schemas.openxmlformats.org/officeDocument/2006/math">
+                    <m:oMathParaPr>
+                      <m:jc m:val="centerGroup"/>
+                    </m:oMathParaPr>
+                    <m:oMath xmlns:m="http://schemas.openxmlformats.org/officeDocument/2006/math">
+                      <m:sSub>
+                        <m:sSubPr>
+                          <m:ctrlPr>
+                            <a:rPr lang="en-US" sz="1400" i="1" smtClean="0">
+                              <a:solidFill>
+                                <a:schemeClr val="tx1"/>
+                              </a:solidFill>
+                              <a:latin typeface="Cambria Math" panose="02040503050406030204" pitchFamily="18" charset="0"/>
+                            </a:rPr>
+                          </m:ctrlPr>
+                        </m:sSubPr>
+                        <m:e>
+                          <m:r>
+                            <a:rPr lang="en-US" sz="1400" i="1">
+                              <a:solidFill>
+                                <a:schemeClr val="tx1"/>
+                              </a:solidFill>
+                              <a:latin typeface="Cambria Math" panose="02040503050406030204" pitchFamily="18" charset="0"/>
+                            </a:rPr>
+                            <m:t>𝑘</m:t>
+                          </m:r>
+                        </m:e>
+                        <m:sub>
+                          <m:r>
+                            <a:rPr lang="en-US" sz="1400" i="1">
+                              <a:solidFill>
+                                <a:schemeClr val="tx1"/>
+                              </a:solidFill>
+                              <a:latin typeface="Cambria Math" panose="02040503050406030204" pitchFamily="18" charset="0"/>
+                            </a:rPr>
+                            <m:t>𝐵</m:t>
+                          </m:r>
+                        </m:sub>
+                      </m:sSub>
+                      <m:r>
+                        <a:rPr lang="en-US" sz="1400" i="1">
+                          <a:solidFill>
+                            <a:schemeClr val="tx1"/>
+                          </a:solidFill>
+                          <a:latin typeface="Cambria Math" panose="02040503050406030204" pitchFamily="18" charset="0"/>
+                        </a:rPr>
+                        <m:t>=1</m:t>
+                      </m:r>
+                      <m:r>
+                        <a:rPr lang="en-US" sz="1400" b="0" i="1" smtClean="0">
+                          <a:solidFill>
+                            <a:schemeClr val="tx1"/>
+                          </a:solidFill>
+                          <a:latin typeface="Cambria Math" panose="02040503050406030204" pitchFamily="18" charset="0"/>
+                        </a:rPr>
+                        <m:t>.</m:t>
+                      </m:r>
+                      <m:r>
+                        <a:rPr lang="en-US" sz="1400" i="1">
+                          <a:solidFill>
+                            <a:schemeClr val="tx1"/>
+                          </a:solidFill>
+                          <a:latin typeface="Cambria Math" panose="02040503050406030204" pitchFamily="18" charset="0"/>
+                        </a:rPr>
+                        <m:t>38</m:t>
+                      </m:r>
+                      <m:r>
+                        <a:rPr lang="en-US" sz="1400" i="1">
+                          <a:solidFill>
+                            <a:srgbClr val="002060"/>
+                          </a:solidFill>
+                          <a:latin typeface="Cambria Math" panose="02040503050406030204" pitchFamily="18" charset="0"/>
+                          <a:ea typeface="Cambria Math" panose="02040503050406030204" pitchFamily="18" charset="0"/>
+                        </a:rPr>
+                        <m:t>×</m:t>
+                      </m:r>
+                      <m:sSup>
+                        <m:sSupPr>
+                          <m:ctrlPr>
+                            <a:rPr lang="en-US" sz="1400" i="1">
+                              <a:solidFill>
+                                <a:srgbClr val="002060"/>
+                              </a:solidFill>
+                              <a:latin typeface="Cambria Math" panose="02040503050406030204" pitchFamily="18" charset="0"/>
+                              <a:ea typeface="Cambria Math" panose="02040503050406030204" pitchFamily="18" charset="0"/>
+                            </a:rPr>
+                          </m:ctrlPr>
+                        </m:sSupPr>
+                        <m:e>
+                          <m:r>
+                            <a:rPr lang="en-US" sz="1400" i="1">
+                              <a:solidFill>
+                                <a:srgbClr val="002060"/>
+                              </a:solidFill>
+                              <a:latin typeface="Cambria Math" panose="02040503050406030204" pitchFamily="18" charset="0"/>
+                              <a:ea typeface="Cambria Math" panose="02040503050406030204" pitchFamily="18" charset="0"/>
+                            </a:rPr>
+                            <m:t>10</m:t>
+                          </m:r>
+                        </m:e>
+                        <m:sup>
+                          <m:r>
+                            <a:rPr lang="en-US" sz="1400" i="1">
+                              <a:solidFill>
+                                <a:srgbClr val="002060"/>
+                              </a:solidFill>
+                              <a:latin typeface="Cambria Math" panose="02040503050406030204" pitchFamily="18" charset="0"/>
+                              <a:ea typeface="Cambria Math" panose="02040503050406030204" pitchFamily="18" charset="0"/>
+                            </a:rPr>
+                            <m:t>−</m:t>
+                          </m:r>
+                          <m:r>
+                            <a:rPr lang="en-US" sz="1400" b="0" i="1" smtClean="0">
+                              <a:solidFill>
+                                <a:srgbClr val="002060"/>
+                              </a:solidFill>
+                              <a:latin typeface="Cambria Math" panose="02040503050406030204" pitchFamily="18" charset="0"/>
+                              <a:ea typeface="Cambria Math" panose="02040503050406030204" pitchFamily="18" charset="0"/>
+                            </a:rPr>
+                            <m:t>2</m:t>
+                          </m:r>
+                        </m:sup>
+                      </m:sSup>
+                      <m:f>
+                        <m:fPr>
+                          <m:ctrlPr>
+                            <a:rPr lang="en-US" sz="1400" i="1">
+                              <a:solidFill>
+                                <a:schemeClr val="tx1"/>
+                              </a:solidFill>
+                              <a:latin typeface="Cambria Math" panose="02040503050406030204" pitchFamily="18" charset="0"/>
+                            </a:rPr>
+                          </m:ctrlPr>
+                        </m:fPr>
+                        <m:num>
+                          <m:r>
+                            <a:rPr lang="en-US" sz="1400" i="1">
+                              <a:solidFill>
+                                <a:schemeClr val="tx1"/>
+                              </a:solidFill>
+                              <a:latin typeface="Cambria Math" panose="02040503050406030204" pitchFamily="18" charset="0"/>
+                            </a:rPr>
+                            <m:t>𝑓𝑊</m:t>
+                          </m:r>
+                        </m:num>
+                        <m:den>
+                          <m:r>
+                            <a:rPr lang="en-US" sz="1400" i="1">
+                              <a:solidFill>
+                                <a:schemeClr val="tx1"/>
+                              </a:solidFill>
+                              <a:latin typeface="Cambria Math" panose="02040503050406030204" pitchFamily="18" charset="0"/>
+                            </a:rPr>
+                            <m:t>𝐺𝐻𝑧</m:t>
+                          </m:r>
+                          <m:r>
+                            <a:rPr lang="en-US" sz="1400" i="1">
+                              <a:solidFill>
+                                <a:schemeClr val="tx1"/>
+                              </a:solidFill>
+                              <a:latin typeface="Cambria Math" panose="02040503050406030204" pitchFamily="18" charset="0"/>
+                              <a:ea typeface="Cambria Math" panose="02040503050406030204" pitchFamily="18" charset="0"/>
+                            </a:rPr>
+                            <m:t>∙</m:t>
+                          </m:r>
+                          <m:r>
+                            <a:rPr lang="en-US" sz="1400" b="0" i="1" smtClean="0">
+                              <a:solidFill>
+                                <a:schemeClr val="tx1"/>
+                              </a:solidFill>
+                              <a:latin typeface="Cambria Math" panose="02040503050406030204" pitchFamily="18" charset="0"/>
+                              <a:ea typeface="Cambria Math" panose="02040503050406030204" pitchFamily="18" charset="0"/>
+                            </a:rPr>
+                            <m:t>𝑚</m:t>
+                          </m:r>
+                          <m:r>
+                            <a:rPr lang="en-US" sz="1400" i="1">
+                              <a:solidFill>
+                                <a:schemeClr val="tx1"/>
+                              </a:solidFill>
+                              <a:latin typeface="Cambria Math" panose="02040503050406030204" pitchFamily="18" charset="0"/>
+                              <a:ea typeface="Cambria Math" panose="02040503050406030204" pitchFamily="18" charset="0"/>
+                            </a:rPr>
+                            <m:t>𝐾</m:t>
+                          </m:r>
+                        </m:den>
+                      </m:f>
+                    </m:oMath>
+                  </m:oMathPara>
+                </a14:m>
+                <a:endParaRPr lang="en-US" sz="1400" dirty="0">
+                  <a:solidFill>
+                    <a:schemeClr val="tx1"/>
+                  </a:solidFill>
+                </a:endParaRPr>
+              </a:p>
+            </p:txBody>
+          </p:sp>
+        </mc:Choice>
+        <mc:Fallback>
+          <p:sp>
+            <p:nvSpPr>
+              <p:cNvPr id="21" name="Rectangle: Rounded Corners 20">
+                <a:extLst>
+                  <a:ext uri="{FF2B5EF4-FFF2-40B4-BE49-F238E27FC236}">
+                    <a16:creationId xmlns:a16="http://schemas.microsoft.com/office/drawing/2014/main" id="{DDFAA716-2272-285C-CAC1-E4E20EB611BB}"/>
+                  </a:ext>
+                </a:extLst>
+              </p:cNvPr>
+              <p:cNvSpPr>
+                <a:spLocks noRot="1" noChangeAspect="1" noMove="1" noResize="1" noEditPoints="1" noAdjustHandles="1" noChangeArrowheads="1" noChangeShapeType="1" noTextEdit="1"/>
+              </p:cNvSpPr>
+              <p:nvPr/>
+            </p:nvSpPr>
+            <p:spPr>
+              <a:xfrm>
+                <a:off x="6911673" y="5778073"/>
+                <a:ext cx="2514600" cy="914400"/>
+              </a:xfrm>
+              <a:prstGeom prst="roundRect">
+                <a:avLst/>
+              </a:prstGeom>
+              <a:blipFill>
+                <a:blip r:embed="rId4"/>
+                <a:stretch>
+                  <a:fillRect/>
+                </a:stretch>
+              </a:blipFill>
+            </p:spPr>
+            <p:txBody>
+              <a:bodyPr/>
+              <a:lstStyle/>
+              <a:p>
+                <a:r>
+                  <a:rPr lang="en-US">
+                    <a:noFill/>
+                  </a:rPr>
+                  <a:t> </a:t>
+                </a:r>
+              </a:p>
+            </p:txBody>
+          </p:sp>
+        </mc:Fallback>
+      </mc:AlternateContent>
+      <mc:AlternateContent xmlns:mc="http://schemas.openxmlformats.org/markup-compatibility/2006">
+        <mc:Choice xmlns:a14="http://schemas.microsoft.com/office/drawing/2010/main" Requires="a14">
+          <p:sp>
+            <p:nvSpPr>
+              <p:cNvPr id="23" name="Rectangle: Rounded Corners 22">
+                <a:extLst>
+                  <a:ext uri="{FF2B5EF4-FFF2-40B4-BE49-F238E27FC236}">
+                    <a16:creationId xmlns:a16="http://schemas.microsoft.com/office/drawing/2014/main" id="{79375B6B-AE3C-1C61-BE2C-B06D32E87695}"/>
+                  </a:ext>
+                </a:extLst>
+              </p:cNvPr>
+              <p:cNvSpPr/>
+              <p:nvPr/>
+            </p:nvSpPr>
+            <p:spPr>
+              <a:xfrm>
+                <a:off x="4232366" y="5501667"/>
+                <a:ext cx="2011680" cy="1371600"/>
+              </a:xfrm>
+              <a:prstGeom prst="roundRect">
+                <a:avLst/>
+              </a:prstGeom>
+              <a:solidFill>
+                <a:srgbClr val="FF61FF"/>
+              </a:solidFill>
+            </p:spPr>
+            <p:style>
+              <a:lnRef idx="2">
+                <a:schemeClr val="accent1">
+                  <a:shade val="15000"/>
+                </a:schemeClr>
+              </a:lnRef>
+              <a:fillRef idx="1">
+                <a:schemeClr val="accent1"/>
+              </a:fillRef>
+              <a:effectRef idx="0">
+                <a:schemeClr val="accent1"/>
+              </a:effectRef>
+              <a:fontRef idx="minor">
+                <a:schemeClr val="lt1"/>
+              </a:fontRef>
+            </p:style>
+            <p:txBody>
+              <a:bodyPr rtlCol="0" anchor="ctr"/>
+              <a:lstStyle/>
+              <a:p>
+                <a:pPr algn="ctr"/>
+                <a14:m>
+                  <m:oMathPara xmlns:m="http://schemas.openxmlformats.org/officeDocument/2006/math">
+                    <m:oMathParaPr>
+                      <m:jc m:val="centerGroup"/>
+                    </m:oMathParaPr>
+                    <m:oMath xmlns:m="http://schemas.openxmlformats.org/officeDocument/2006/math">
+                      <m:f>
+                        <m:fPr>
+                          <m:ctrlPr>
+                            <a:rPr lang="en-US" sz="1400" i="1" smtClean="0">
+                              <a:solidFill>
+                                <a:srgbClr val="002060"/>
+                              </a:solidFill>
+                              <a:latin typeface="Cambria Math" panose="02040503050406030204" pitchFamily="18" charset="0"/>
+                            </a:rPr>
+                          </m:ctrlPr>
+                        </m:fPr>
+                        <m:num>
+                          <m:sSub>
+                            <m:sSubPr>
+                              <m:ctrlPr>
+                                <a:rPr lang="en-US" sz="1400" i="1">
+                                  <a:solidFill>
+                                    <a:srgbClr val="002060"/>
+                                  </a:solidFill>
+                                  <a:latin typeface="Cambria Math" panose="02040503050406030204" pitchFamily="18" charset="0"/>
+                                </a:rPr>
+                              </m:ctrlPr>
+                            </m:sSubPr>
+                            <m:e>
+                              <m:r>
+                                <a:rPr lang="en-US" sz="1400" i="1">
+                                  <a:solidFill>
+                                    <a:srgbClr val="002060"/>
+                                  </a:solidFill>
+                                  <a:latin typeface="Cambria Math" panose="02040503050406030204" pitchFamily="18" charset="0"/>
+                                </a:rPr>
+                                <m:t>𝑘</m:t>
+                              </m:r>
+                            </m:e>
+                            <m:sub>
+                              <m:r>
+                                <a:rPr lang="en-US" sz="1400" i="1">
+                                  <a:solidFill>
+                                    <a:srgbClr val="002060"/>
+                                  </a:solidFill>
+                                  <a:latin typeface="Cambria Math" panose="02040503050406030204" pitchFamily="18" charset="0"/>
+                                </a:rPr>
+                                <m:t>𝐵</m:t>
+                              </m:r>
+                            </m:sub>
+                          </m:sSub>
+                        </m:num>
+                        <m:den>
+                          <m:r>
+                            <a:rPr lang="en-US" sz="1400" i="1">
+                              <a:solidFill>
+                                <a:srgbClr val="002060"/>
+                              </a:solidFill>
+                              <a:latin typeface="Cambria Math" panose="02040503050406030204" pitchFamily="18" charset="0"/>
+                            </a:rPr>
+                            <m:t>𝑒</m:t>
+                          </m:r>
+                        </m:den>
+                      </m:f>
+                      <m:r>
+                        <a:rPr lang="en-US" sz="1400" i="1">
+                          <a:solidFill>
+                            <a:srgbClr val="002060"/>
+                          </a:solidFill>
+                          <a:latin typeface="Cambria Math" panose="02040503050406030204" pitchFamily="18" charset="0"/>
+                        </a:rPr>
+                        <m:t>=8</m:t>
+                      </m:r>
+                      <m:r>
+                        <a:rPr lang="en-US" sz="1400" b="0" i="1" smtClean="0">
+                          <a:solidFill>
+                            <a:srgbClr val="002060"/>
+                          </a:solidFill>
+                          <a:latin typeface="Cambria Math" panose="02040503050406030204" pitchFamily="18" charset="0"/>
+                        </a:rPr>
+                        <m:t>.</m:t>
+                      </m:r>
+                      <m:r>
+                        <a:rPr lang="en-US" sz="1400" i="1">
+                          <a:solidFill>
+                            <a:srgbClr val="002060"/>
+                          </a:solidFill>
+                          <a:latin typeface="Cambria Math" panose="02040503050406030204" pitchFamily="18" charset="0"/>
+                        </a:rPr>
+                        <m:t>62</m:t>
+                      </m:r>
+                      <m:r>
+                        <a:rPr lang="en-US" sz="1400" i="1">
+                          <a:solidFill>
+                            <a:srgbClr val="002060"/>
+                          </a:solidFill>
+                          <a:latin typeface="Cambria Math" panose="02040503050406030204" pitchFamily="18" charset="0"/>
+                          <a:ea typeface="Cambria Math" panose="02040503050406030204" pitchFamily="18" charset="0"/>
+                        </a:rPr>
+                        <m:t>×</m:t>
+                      </m:r>
+                      <m:sSup>
+                        <m:sSupPr>
+                          <m:ctrlPr>
+                            <a:rPr lang="en-US" sz="1400" i="1">
+                              <a:solidFill>
+                                <a:srgbClr val="002060"/>
+                              </a:solidFill>
+                              <a:latin typeface="Cambria Math" panose="02040503050406030204" pitchFamily="18" charset="0"/>
+                              <a:ea typeface="Cambria Math" panose="02040503050406030204" pitchFamily="18" charset="0"/>
+                            </a:rPr>
+                          </m:ctrlPr>
+                        </m:sSupPr>
+                        <m:e>
+                          <m:r>
+                            <a:rPr lang="en-US" sz="1400" i="1">
+                              <a:solidFill>
+                                <a:srgbClr val="002060"/>
+                              </a:solidFill>
+                              <a:latin typeface="Cambria Math" panose="02040503050406030204" pitchFamily="18" charset="0"/>
+                              <a:ea typeface="Cambria Math" panose="02040503050406030204" pitchFamily="18" charset="0"/>
+                            </a:rPr>
+                            <m:t>10</m:t>
+                          </m:r>
+                        </m:e>
+                        <m:sup>
+                          <m:r>
+                            <a:rPr lang="en-US" sz="1400" i="1">
+                              <a:solidFill>
+                                <a:srgbClr val="002060"/>
+                              </a:solidFill>
+                              <a:latin typeface="Cambria Math" panose="02040503050406030204" pitchFamily="18" charset="0"/>
+                              <a:ea typeface="Cambria Math" panose="02040503050406030204" pitchFamily="18" charset="0"/>
+                            </a:rPr>
+                            <m:t>−</m:t>
+                          </m:r>
+                          <m:r>
+                            <a:rPr lang="en-US" sz="1400" b="0" i="1" smtClean="0">
+                              <a:solidFill>
+                                <a:srgbClr val="002060"/>
+                              </a:solidFill>
+                              <a:latin typeface="Cambria Math" panose="02040503050406030204" pitchFamily="18" charset="0"/>
+                              <a:ea typeface="Cambria Math" panose="02040503050406030204" pitchFamily="18" charset="0"/>
+                            </a:rPr>
+                            <m:t>5</m:t>
+                          </m:r>
+                        </m:sup>
+                      </m:sSup>
+                      <m:f>
+                        <m:fPr>
+                          <m:ctrlPr>
+                            <a:rPr lang="en-US" sz="1400" i="1">
+                              <a:solidFill>
+                                <a:srgbClr val="002060"/>
+                              </a:solidFill>
+                              <a:latin typeface="Cambria Math" panose="02040503050406030204" pitchFamily="18" charset="0"/>
+                            </a:rPr>
+                          </m:ctrlPr>
+                        </m:fPr>
+                        <m:num>
+                          <m:r>
+                            <a:rPr lang="en-US" sz="1400" b="0" i="1" smtClean="0">
+                              <a:solidFill>
+                                <a:srgbClr val="002060"/>
+                              </a:solidFill>
+                              <a:latin typeface="Cambria Math" panose="02040503050406030204" pitchFamily="18" charset="0"/>
+                            </a:rPr>
+                            <m:t>𝑚</m:t>
+                          </m:r>
+                          <m:r>
+                            <a:rPr lang="en-US" sz="1400" i="1">
+                              <a:solidFill>
+                                <a:srgbClr val="002060"/>
+                              </a:solidFill>
+                              <a:latin typeface="Cambria Math" panose="02040503050406030204" pitchFamily="18" charset="0"/>
+                              <a:ea typeface="Cambria Math" panose="02040503050406030204" pitchFamily="18" charset="0"/>
+                            </a:rPr>
+                            <m:t>𝑉</m:t>
+                          </m:r>
+                        </m:num>
+                        <m:den>
+                          <m:r>
+                            <a:rPr lang="en-US" sz="1400" b="0" i="1" smtClean="0">
+                              <a:solidFill>
+                                <a:srgbClr val="002060"/>
+                              </a:solidFill>
+                              <a:latin typeface="Cambria Math" panose="02040503050406030204" pitchFamily="18" charset="0"/>
+                              <a:ea typeface="Cambria Math" panose="02040503050406030204" pitchFamily="18" charset="0"/>
+                            </a:rPr>
+                            <m:t>𝑚</m:t>
+                          </m:r>
+                          <m:r>
+                            <a:rPr lang="en-US" sz="1400" i="1">
+                              <a:solidFill>
+                                <a:srgbClr val="002060"/>
+                              </a:solidFill>
+                              <a:latin typeface="Cambria Math" panose="02040503050406030204" pitchFamily="18" charset="0"/>
+                            </a:rPr>
+                            <m:t>𝐾</m:t>
+                          </m:r>
+                        </m:den>
+                      </m:f>
+                    </m:oMath>
+                  </m:oMathPara>
+                </a14:m>
+                <a:endParaRPr lang="en-US" sz="1400" dirty="0">
+                  <a:solidFill>
+                    <a:srgbClr val="002060"/>
+                  </a:solidFill>
+                  <a:ea typeface="Cambria Math" panose="02040503050406030204" pitchFamily="18" charset="0"/>
+                </a:endParaRPr>
+              </a:p>
+              <a:p>
+                <a:pPr algn="ctr"/>
+                <a:endParaRPr lang="en-US" sz="1400" dirty="0">
+                  <a:solidFill>
+                    <a:srgbClr val="002060"/>
+                  </a:solidFill>
+                  <a:ea typeface="Cambria Math" panose="02040503050406030204" pitchFamily="18" charset="0"/>
+                </a:endParaRPr>
+              </a:p>
+              <a:p>
+                <a:pPr algn="ctr"/>
+                <a14:m>
+                  <m:oMathPara xmlns:m="http://schemas.openxmlformats.org/officeDocument/2006/math">
+                    <m:oMathParaPr>
+                      <m:jc m:val="centerGroup"/>
+                    </m:oMathParaPr>
+                    <m:oMath xmlns:m="http://schemas.openxmlformats.org/officeDocument/2006/math">
+                      <m:f>
+                        <m:fPr>
+                          <m:ctrlPr>
+                            <a:rPr lang="en-US" sz="1400" i="1">
+                              <a:solidFill>
+                                <a:srgbClr val="002060"/>
+                              </a:solidFill>
+                              <a:latin typeface="Cambria Math" panose="02040503050406030204" pitchFamily="18" charset="0"/>
+                            </a:rPr>
+                          </m:ctrlPr>
+                        </m:fPr>
+                        <m:num>
+                          <m:r>
+                            <a:rPr lang="en-US" sz="1400" i="1">
+                              <a:solidFill>
+                                <a:srgbClr val="002060"/>
+                              </a:solidFill>
+                              <a:latin typeface="Cambria Math" panose="02040503050406030204" pitchFamily="18" charset="0"/>
+                            </a:rPr>
+                            <m:t>𝑒</m:t>
+                          </m:r>
+                        </m:num>
+                        <m:den>
+                          <m:sSub>
+                            <m:sSubPr>
+                              <m:ctrlPr>
+                                <a:rPr lang="en-US" sz="1400" i="1">
+                                  <a:solidFill>
+                                    <a:srgbClr val="002060"/>
+                                  </a:solidFill>
+                                  <a:latin typeface="Cambria Math" panose="02040503050406030204" pitchFamily="18" charset="0"/>
+                                </a:rPr>
+                              </m:ctrlPr>
+                            </m:sSubPr>
+                            <m:e>
+                              <m:r>
+                                <a:rPr lang="en-US" sz="1400" i="1">
+                                  <a:solidFill>
+                                    <a:srgbClr val="002060"/>
+                                  </a:solidFill>
+                                  <a:latin typeface="Cambria Math" panose="02040503050406030204" pitchFamily="18" charset="0"/>
+                                </a:rPr>
+                                <m:t>𝑘</m:t>
+                              </m:r>
+                            </m:e>
+                            <m:sub>
+                              <m:r>
+                                <a:rPr lang="en-US" sz="1400" i="1">
+                                  <a:solidFill>
+                                    <a:srgbClr val="002060"/>
+                                  </a:solidFill>
+                                  <a:latin typeface="Cambria Math" panose="02040503050406030204" pitchFamily="18" charset="0"/>
+                                </a:rPr>
+                                <m:t>𝐵</m:t>
+                              </m:r>
+                            </m:sub>
+                          </m:sSub>
+                        </m:den>
+                      </m:f>
+                      <m:r>
+                        <a:rPr lang="en-US" sz="1400" i="1">
+                          <a:solidFill>
+                            <a:srgbClr val="002060"/>
+                          </a:solidFill>
+                          <a:latin typeface="Cambria Math" panose="02040503050406030204" pitchFamily="18" charset="0"/>
+                        </a:rPr>
+                        <m:t>=1</m:t>
+                      </m:r>
+                      <m:r>
+                        <a:rPr lang="en-US" sz="1400" b="0" i="1" smtClean="0">
+                          <a:solidFill>
+                            <a:srgbClr val="002060"/>
+                          </a:solidFill>
+                          <a:latin typeface="Cambria Math" panose="02040503050406030204" pitchFamily="18" charset="0"/>
+                        </a:rPr>
+                        <m:t>.</m:t>
+                      </m:r>
+                      <m:r>
+                        <a:rPr lang="en-US" sz="1400" i="1">
+                          <a:solidFill>
+                            <a:srgbClr val="002060"/>
+                          </a:solidFill>
+                          <a:latin typeface="Cambria Math" panose="02040503050406030204" pitchFamily="18" charset="0"/>
+                        </a:rPr>
+                        <m:t>16</m:t>
+                      </m:r>
+                      <m:r>
+                        <a:rPr lang="en-US" sz="1400" i="1">
+                          <a:solidFill>
+                            <a:srgbClr val="002060"/>
+                          </a:solidFill>
+                          <a:latin typeface="Cambria Math" panose="02040503050406030204" pitchFamily="18" charset="0"/>
+                          <a:ea typeface="Cambria Math" panose="02040503050406030204" pitchFamily="18" charset="0"/>
+                        </a:rPr>
+                        <m:t>×</m:t>
+                      </m:r>
+                      <m:sSup>
+                        <m:sSupPr>
+                          <m:ctrlPr>
+                            <a:rPr lang="en-US" sz="1400" i="1">
+                              <a:solidFill>
+                                <a:srgbClr val="002060"/>
+                              </a:solidFill>
+                              <a:latin typeface="Cambria Math" panose="02040503050406030204" pitchFamily="18" charset="0"/>
+                              <a:ea typeface="Cambria Math" panose="02040503050406030204" pitchFamily="18" charset="0"/>
+                            </a:rPr>
+                          </m:ctrlPr>
+                        </m:sSupPr>
+                        <m:e>
+                          <m:r>
+                            <a:rPr lang="en-US" sz="1400" i="1">
+                              <a:solidFill>
+                                <a:srgbClr val="002060"/>
+                              </a:solidFill>
+                              <a:latin typeface="Cambria Math" panose="02040503050406030204" pitchFamily="18" charset="0"/>
+                              <a:ea typeface="Cambria Math" panose="02040503050406030204" pitchFamily="18" charset="0"/>
+                            </a:rPr>
+                            <m:t>10</m:t>
+                          </m:r>
+                        </m:e>
+                        <m:sup>
+                          <m:r>
+                            <a:rPr lang="en-US" sz="1400" b="0" i="1" smtClean="0">
+                              <a:solidFill>
+                                <a:srgbClr val="002060"/>
+                              </a:solidFill>
+                              <a:latin typeface="Cambria Math" panose="02040503050406030204" pitchFamily="18" charset="0"/>
+                              <a:ea typeface="Cambria Math" panose="02040503050406030204" pitchFamily="18" charset="0"/>
+                            </a:rPr>
+                            <m:t>4</m:t>
+                          </m:r>
+                        </m:sup>
+                      </m:sSup>
+                      <m:f>
+                        <m:fPr>
+                          <m:ctrlPr>
+                            <a:rPr lang="en-US" sz="1400" i="1">
+                              <a:solidFill>
+                                <a:srgbClr val="002060"/>
+                              </a:solidFill>
+                              <a:latin typeface="Cambria Math" panose="02040503050406030204" pitchFamily="18" charset="0"/>
+                            </a:rPr>
+                          </m:ctrlPr>
+                        </m:fPr>
+                        <m:num>
+                          <m:r>
+                            <a:rPr lang="en-US" sz="1400" b="0" i="1" smtClean="0">
+                              <a:solidFill>
+                                <a:srgbClr val="002060"/>
+                              </a:solidFill>
+                              <a:latin typeface="Cambria Math" panose="02040503050406030204" pitchFamily="18" charset="0"/>
+                            </a:rPr>
+                            <m:t>𝑚</m:t>
+                          </m:r>
+                          <m:r>
+                            <a:rPr lang="en-US" sz="1400" i="1">
+                              <a:solidFill>
+                                <a:srgbClr val="002060"/>
+                              </a:solidFill>
+                              <a:latin typeface="Cambria Math" panose="02040503050406030204" pitchFamily="18" charset="0"/>
+                            </a:rPr>
+                            <m:t>𝐾</m:t>
+                          </m:r>
+                        </m:num>
+                        <m:den>
+                          <m:r>
+                            <a:rPr lang="en-US" sz="1400" i="1">
+                              <a:solidFill>
+                                <a:srgbClr val="002060"/>
+                              </a:solidFill>
+                              <a:latin typeface="Cambria Math" panose="02040503050406030204" pitchFamily="18" charset="0"/>
+                            </a:rPr>
+                            <m:t>𝑚𝑉</m:t>
+                          </m:r>
+                        </m:den>
+                      </m:f>
+                    </m:oMath>
+                  </m:oMathPara>
+                </a14:m>
+                <a:endParaRPr lang="en-US" sz="1400" dirty="0">
+                  <a:solidFill>
+                    <a:srgbClr val="002060"/>
+                  </a:solidFill>
+                </a:endParaRPr>
+              </a:p>
+            </p:txBody>
+          </p:sp>
+        </mc:Choice>
+        <mc:Fallback>
+          <p:sp>
+            <p:nvSpPr>
+              <p:cNvPr id="23" name="Rectangle: Rounded Corners 22">
+                <a:extLst>
+                  <a:ext uri="{FF2B5EF4-FFF2-40B4-BE49-F238E27FC236}">
+                    <a16:creationId xmlns:a16="http://schemas.microsoft.com/office/drawing/2014/main" id="{79375B6B-AE3C-1C61-BE2C-B06D32E87695}"/>
+                  </a:ext>
+                </a:extLst>
+              </p:cNvPr>
+              <p:cNvSpPr>
+                <a:spLocks noRot="1" noChangeAspect="1" noMove="1" noResize="1" noEditPoints="1" noAdjustHandles="1" noChangeArrowheads="1" noChangeShapeType="1" noTextEdit="1"/>
+              </p:cNvSpPr>
+              <p:nvPr/>
+            </p:nvSpPr>
+            <p:spPr>
+              <a:xfrm>
+                <a:off x="4232366" y="5501667"/>
+                <a:ext cx="2011680" cy="1371600"/>
+              </a:xfrm>
+              <a:prstGeom prst="roundRect">
+                <a:avLst/>
+              </a:prstGeom>
+              <a:blipFill>
+                <a:blip r:embed="rId5"/>
+                <a:stretch>
+                  <a:fillRect/>
+                </a:stretch>
+              </a:blipFill>
+            </p:spPr>
+            <p:txBody>
+              <a:bodyPr/>
+              <a:lstStyle/>
+              <a:p>
+                <a:r>
+                  <a:rPr lang="en-US">
+                    <a:noFill/>
+                  </a:rPr>
+                  <a:t> </a:t>
+                </a:r>
+              </a:p>
+            </p:txBody>
+          </p:sp>
+        </mc:Fallback>
+      </mc:AlternateContent>
+      <mc:AlternateContent xmlns:mc="http://schemas.openxmlformats.org/markup-compatibility/2006">
+        <mc:Choice xmlns:a14="http://schemas.microsoft.com/office/drawing/2010/main" Requires="a14">
+          <p:sp>
+            <p:nvSpPr>
+              <p:cNvPr id="27" name="Rectangle: Rounded Corners 26">
+                <a:extLst>
+                  <a:ext uri="{FF2B5EF4-FFF2-40B4-BE49-F238E27FC236}">
+                    <a16:creationId xmlns:a16="http://schemas.microsoft.com/office/drawing/2014/main" id="{439C5FB7-D09A-CD38-9FD3-F236846536E5}"/>
+                  </a:ext>
+                </a:extLst>
+              </p:cNvPr>
+              <p:cNvSpPr/>
+              <p:nvPr/>
+            </p:nvSpPr>
+            <p:spPr>
+              <a:xfrm>
+                <a:off x="5421904" y="3361786"/>
+                <a:ext cx="2514600" cy="914400"/>
+              </a:xfrm>
+              <a:prstGeom prst="roundRect">
+                <a:avLst/>
+              </a:prstGeom>
+              <a:solidFill>
+                <a:srgbClr val="92D050"/>
+              </a:solidFill>
+            </p:spPr>
+            <p:style>
+              <a:lnRef idx="2">
+                <a:schemeClr val="accent1">
+                  <a:shade val="15000"/>
+                </a:schemeClr>
+              </a:lnRef>
+              <a:fillRef idx="1">
+                <a:schemeClr val="accent1"/>
+              </a:fillRef>
+              <a:effectRef idx="0">
+                <a:schemeClr val="accent1"/>
+              </a:effectRef>
+              <a:fontRef idx="minor">
+                <a:schemeClr val="lt1"/>
+              </a:fontRef>
+            </p:style>
+            <p:txBody>
+              <a:bodyPr rtlCol="0" anchor="ctr"/>
+              <a:lstStyle/>
+              <a:p>
+                <a:pPr algn="ctr"/>
+                <a14:m>
+                  <m:oMathPara xmlns:m="http://schemas.openxmlformats.org/officeDocument/2006/math">
+                    <m:oMathParaPr>
+                      <m:jc m:val="centerGroup"/>
+                    </m:oMathParaPr>
+                    <m:oMath xmlns:m="http://schemas.openxmlformats.org/officeDocument/2006/math">
+                      <m:f>
+                        <m:fPr>
+                          <m:ctrlPr>
+                            <a:rPr lang="en-US" sz="1400" i="1">
+                              <a:solidFill>
+                                <a:srgbClr val="002060"/>
+                              </a:solidFill>
+                              <a:latin typeface="Cambria Math" panose="02040503050406030204" pitchFamily="18" charset="0"/>
+                            </a:rPr>
+                          </m:ctrlPr>
+                        </m:fPr>
+                        <m:num>
+                          <m:r>
+                            <a:rPr lang="en-US" sz="1400" i="1">
+                              <a:solidFill>
+                                <a:srgbClr val="002060"/>
+                              </a:solidFill>
+                              <a:latin typeface="Cambria Math" panose="02040503050406030204" pitchFamily="18" charset="0"/>
+                            </a:rPr>
+                            <m:t>h</m:t>
+                          </m:r>
+                        </m:num>
+                        <m:den>
+                          <m:sSub>
+                            <m:sSubPr>
+                              <m:ctrlPr>
+                                <a:rPr lang="en-US" sz="1400" i="1">
+                                  <a:solidFill>
+                                    <a:srgbClr val="002060"/>
+                                  </a:solidFill>
+                                  <a:latin typeface="Cambria Math" panose="02040503050406030204" pitchFamily="18" charset="0"/>
+                                </a:rPr>
+                              </m:ctrlPr>
+                            </m:sSubPr>
+                            <m:e>
+                              <m:r>
+                                <a:rPr lang="en-US" sz="1400" i="1">
+                                  <a:solidFill>
+                                    <a:srgbClr val="002060"/>
+                                  </a:solidFill>
+                                  <a:latin typeface="Cambria Math" panose="02040503050406030204" pitchFamily="18" charset="0"/>
+                                </a:rPr>
+                                <m:t>2</m:t>
+                              </m:r>
+                              <m:r>
+                                <a:rPr lang="en-US" sz="1400" i="1">
+                                  <a:solidFill>
+                                    <a:srgbClr val="002060"/>
+                                  </a:solidFill>
+                                  <a:latin typeface="Cambria Math" panose="02040503050406030204" pitchFamily="18" charset="0"/>
+                                </a:rPr>
+                                <m:t>𝑘</m:t>
+                              </m:r>
+                            </m:e>
+                            <m:sub>
+                              <m:r>
+                                <a:rPr lang="en-US" sz="1400" i="1">
+                                  <a:solidFill>
+                                    <a:srgbClr val="002060"/>
+                                  </a:solidFill>
+                                  <a:latin typeface="Cambria Math" panose="02040503050406030204" pitchFamily="18" charset="0"/>
+                                </a:rPr>
+                                <m:t>𝐵</m:t>
+                              </m:r>
+                            </m:sub>
+                          </m:sSub>
+                        </m:den>
+                      </m:f>
+                      <m:r>
+                        <a:rPr lang="en-US" sz="1400" i="1">
+                          <a:solidFill>
+                            <a:srgbClr val="002060"/>
+                          </a:solidFill>
+                          <a:latin typeface="Cambria Math" panose="02040503050406030204" pitchFamily="18" charset="0"/>
+                        </a:rPr>
+                        <m:t>=24.0 </m:t>
+                      </m:r>
+                      <m:f>
+                        <m:fPr>
+                          <m:ctrlPr>
+                            <a:rPr lang="en-US" sz="1400" i="1">
+                              <a:solidFill>
+                                <a:srgbClr val="002060"/>
+                              </a:solidFill>
+                              <a:latin typeface="Cambria Math" panose="02040503050406030204" pitchFamily="18" charset="0"/>
+                            </a:rPr>
+                          </m:ctrlPr>
+                        </m:fPr>
+                        <m:num>
+                          <m:r>
+                            <a:rPr lang="en-US" sz="1400" i="1">
+                              <a:solidFill>
+                                <a:srgbClr val="002060"/>
+                              </a:solidFill>
+                              <a:latin typeface="Cambria Math" panose="02040503050406030204" pitchFamily="18" charset="0"/>
+                            </a:rPr>
+                            <m:t>𝑚𝐾</m:t>
+                          </m:r>
+                        </m:num>
+                        <m:den>
+                          <m:r>
+                            <a:rPr lang="en-US" sz="1400" i="1">
+                              <a:solidFill>
+                                <a:srgbClr val="002060"/>
+                              </a:solidFill>
+                              <a:latin typeface="Cambria Math" panose="02040503050406030204" pitchFamily="18" charset="0"/>
+                            </a:rPr>
+                            <m:t>𝐺𝐻𝑧</m:t>
+                          </m:r>
+                        </m:den>
+                      </m:f>
+                    </m:oMath>
+                  </m:oMathPara>
+                </a14:m>
+                <a:endParaRPr lang="en-US" sz="1400" dirty="0">
+                  <a:solidFill>
+                    <a:srgbClr val="002060"/>
+                  </a:solidFill>
+                </a:endParaRPr>
+              </a:p>
+            </p:txBody>
+          </p:sp>
+        </mc:Choice>
+        <mc:Fallback>
+          <p:sp>
+            <p:nvSpPr>
+              <p:cNvPr id="27" name="Rectangle: Rounded Corners 26">
+                <a:extLst>
+                  <a:ext uri="{FF2B5EF4-FFF2-40B4-BE49-F238E27FC236}">
+                    <a16:creationId xmlns:a16="http://schemas.microsoft.com/office/drawing/2014/main" id="{439C5FB7-D09A-CD38-9FD3-F236846536E5}"/>
+                  </a:ext>
+                </a:extLst>
+              </p:cNvPr>
+              <p:cNvSpPr>
+                <a:spLocks noRot="1" noChangeAspect="1" noMove="1" noResize="1" noEditPoints="1" noAdjustHandles="1" noChangeArrowheads="1" noChangeShapeType="1" noTextEdit="1"/>
+              </p:cNvSpPr>
+              <p:nvPr/>
+            </p:nvSpPr>
+            <p:spPr>
+              <a:xfrm>
+                <a:off x="5421904" y="3361786"/>
+                <a:ext cx="2514600" cy="914400"/>
+              </a:xfrm>
+              <a:prstGeom prst="roundRect">
+                <a:avLst/>
+              </a:prstGeom>
+              <a:blipFill>
+                <a:blip r:embed="rId6"/>
+                <a:stretch>
+                  <a:fillRect/>
+                </a:stretch>
+              </a:blipFill>
+            </p:spPr>
+            <p:txBody>
+              <a:bodyPr/>
+              <a:lstStyle/>
+              <a:p>
+                <a:r>
+                  <a:rPr lang="en-US">
+                    <a:noFill/>
+                  </a:rPr>
+                  <a:t> </a:t>
+                </a:r>
+              </a:p>
+            </p:txBody>
+          </p:sp>
+        </mc:Fallback>
+      </mc:AlternateContent>
+      <mc:AlternateContent xmlns:mc="http://schemas.openxmlformats.org/markup-compatibility/2006">
+        <mc:Choice xmlns:a14="http://schemas.microsoft.com/office/drawing/2010/main" Requires="a14">
+          <p:sp>
+            <p:nvSpPr>
+              <p:cNvPr id="28" name="Rectangle: Rounded Corners 27">
+                <a:extLst>
+                  <a:ext uri="{FF2B5EF4-FFF2-40B4-BE49-F238E27FC236}">
+                    <a16:creationId xmlns:a16="http://schemas.microsoft.com/office/drawing/2014/main" id="{37148C56-95B5-0EBC-6170-8B83C71C6CE2}"/>
+                  </a:ext>
+                </a:extLst>
+              </p:cNvPr>
+              <p:cNvSpPr/>
+              <p:nvPr/>
+            </p:nvSpPr>
+            <p:spPr>
+              <a:xfrm>
+                <a:off x="2351190" y="3361786"/>
+                <a:ext cx="2514600" cy="914400"/>
+              </a:xfrm>
+              <a:prstGeom prst="roundRect">
+                <a:avLst/>
+              </a:prstGeom>
+              <a:solidFill>
+                <a:srgbClr val="FFA83F"/>
+              </a:solidFill>
+            </p:spPr>
+            <p:style>
+              <a:lnRef idx="2">
+                <a:schemeClr val="accent1">
+                  <a:shade val="15000"/>
+                </a:schemeClr>
+              </a:lnRef>
+              <a:fillRef idx="1">
+                <a:schemeClr val="accent1"/>
+              </a:fillRef>
+              <a:effectRef idx="0">
+                <a:schemeClr val="accent1"/>
+              </a:effectRef>
+              <a:fontRef idx="minor">
+                <a:schemeClr val="lt1"/>
+              </a:fontRef>
+            </p:style>
+            <p:txBody>
+              <a:bodyPr rtlCol="0" anchor="ctr"/>
+              <a:lstStyle/>
+              <a:p>
+                <a:pPr algn="ctr"/>
+                <a14:m>
+                  <m:oMathPara xmlns:m="http://schemas.openxmlformats.org/officeDocument/2006/math">
+                    <m:oMathParaPr>
+                      <m:jc m:val="centerGroup"/>
+                    </m:oMathParaPr>
+                    <m:oMath xmlns:m="http://schemas.openxmlformats.org/officeDocument/2006/math">
+                      <m:f>
+                        <m:fPr>
+                          <m:ctrlPr>
+                            <a:rPr lang="en-US" sz="1400" i="1" smtClean="0">
+                              <a:solidFill>
+                                <a:srgbClr val="002060"/>
+                              </a:solidFill>
+                              <a:latin typeface="Cambria Math" panose="02040503050406030204" pitchFamily="18" charset="0"/>
+                            </a:rPr>
+                          </m:ctrlPr>
+                        </m:fPr>
+                        <m:num>
+                          <m:r>
+                            <a:rPr lang="en-US" sz="1400" i="1">
+                              <a:solidFill>
+                                <a:srgbClr val="002060"/>
+                              </a:solidFill>
+                              <a:latin typeface="Cambria Math" panose="02040503050406030204" pitchFamily="18" charset="0"/>
+                            </a:rPr>
+                            <m:t>h</m:t>
+                          </m:r>
+                        </m:num>
+                        <m:den>
+                          <m:r>
+                            <a:rPr lang="en-US" sz="1400" i="1">
+                              <a:solidFill>
+                                <a:srgbClr val="002060"/>
+                              </a:solidFill>
+                              <a:latin typeface="Cambria Math" panose="02040503050406030204" pitchFamily="18" charset="0"/>
+                            </a:rPr>
+                            <m:t>2</m:t>
+                          </m:r>
+                          <m:r>
+                            <a:rPr lang="en-US" sz="1400" i="1">
+                              <a:solidFill>
+                                <a:srgbClr val="002060"/>
+                              </a:solidFill>
+                              <a:latin typeface="Cambria Math" panose="02040503050406030204" pitchFamily="18" charset="0"/>
+                            </a:rPr>
+                            <m:t>𝑒</m:t>
+                          </m:r>
+                        </m:den>
+                      </m:f>
+                      <m:r>
+                        <a:rPr lang="en-US" sz="1400" i="1">
+                          <a:solidFill>
+                            <a:srgbClr val="002060"/>
+                          </a:solidFill>
+                          <a:latin typeface="Cambria Math" panose="02040503050406030204" pitchFamily="18" charset="0"/>
+                        </a:rPr>
+                        <m:t>=2.07</m:t>
+                      </m:r>
+                      <m:r>
+                        <a:rPr lang="en-US" sz="1400" i="1" smtClean="0">
+                          <a:solidFill>
+                            <a:srgbClr val="002060"/>
+                          </a:solidFill>
+                          <a:latin typeface="Cambria Math" panose="02040503050406030204" pitchFamily="18" charset="0"/>
+                          <a:ea typeface="Cambria Math" panose="02040503050406030204" pitchFamily="18" charset="0"/>
+                        </a:rPr>
+                        <m:t>×</m:t>
+                      </m:r>
+                      <m:sSup>
+                        <m:sSupPr>
+                          <m:ctrlPr>
+                            <a:rPr lang="en-US" sz="1400" i="1" smtClean="0">
+                              <a:solidFill>
+                                <a:srgbClr val="002060"/>
+                              </a:solidFill>
+                              <a:latin typeface="Cambria Math" panose="02040503050406030204" pitchFamily="18" charset="0"/>
+                              <a:ea typeface="Cambria Math" panose="02040503050406030204" pitchFamily="18" charset="0"/>
+                            </a:rPr>
+                          </m:ctrlPr>
+                        </m:sSupPr>
+                        <m:e>
+                          <m:r>
+                            <a:rPr lang="en-US" sz="1400" b="0" i="1" smtClean="0">
+                              <a:solidFill>
+                                <a:srgbClr val="002060"/>
+                              </a:solidFill>
+                              <a:latin typeface="Cambria Math" panose="02040503050406030204" pitchFamily="18" charset="0"/>
+                              <a:ea typeface="Cambria Math" panose="02040503050406030204" pitchFamily="18" charset="0"/>
+                            </a:rPr>
+                            <m:t>10</m:t>
+                          </m:r>
+                        </m:e>
+                        <m:sup>
+                          <m:r>
+                            <a:rPr lang="en-US" sz="1400" b="0" i="1" smtClean="0">
+                              <a:solidFill>
+                                <a:srgbClr val="002060"/>
+                              </a:solidFill>
+                              <a:latin typeface="Cambria Math" panose="02040503050406030204" pitchFamily="18" charset="0"/>
+                              <a:ea typeface="Cambria Math" panose="02040503050406030204" pitchFamily="18" charset="0"/>
+                            </a:rPr>
+                            <m:t>−3</m:t>
+                          </m:r>
+                        </m:sup>
+                      </m:sSup>
+                      <m:r>
+                        <a:rPr lang="en-US" sz="1400" i="1">
+                          <a:solidFill>
+                            <a:srgbClr val="002060"/>
+                          </a:solidFill>
+                          <a:latin typeface="Cambria Math" panose="02040503050406030204" pitchFamily="18" charset="0"/>
+                        </a:rPr>
+                        <m:t> </m:t>
+                      </m:r>
+                      <m:f>
+                        <m:fPr>
+                          <m:ctrlPr>
+                            <a:rPr lang="en-US" sz="1400" i="1">
+                              <a:solidFill>
+                                <a:srgbClr val="002060"/>
+                              </a:solidFill>
+                              <a:latin typeface="Cambria Math" panose="02040503050406030204" pitchFamily="18" charset="0"/>
+                            </a:rPr>
+                          </m:ctrlPr>
+                        </m:fPr>
+                        <m:num>
+                          <m:r>
+                            <a:rPr lang="en-US" sz="1400" b="0" i="1" smtClean="0">
+                              <a:solidFill>
+                                <a:srgbClr val="002060"/>
+                              </a:solidFill>
+                              <a:latin typeface="Cambria Math" panose="02040503050406030204" pitchFamily="18" charset="0"/>
+                              <a:ea typeface="Cambria Math" panose="02040503050406030204" pitchFamily="18" charset="0"/>
+                            </a:rPr>
+                            <m:t>𝑚</m:t>
+                          </m:r>
+                          <m:r>
+                            <a:rPr lang="en-US" sz="1400" i="1">
+                              <a:solidFill>
+                                <a:srgbClr val="002060"/>
+                              </a:solidFill>
+                              <a:latin typeface="Cambria Math" panose="02040503050406030204" pitchFamily="18" charset="0"/>
+                              <a:ea typeface="Cambria Math" panose="02040503050406030204" pitchFamily="18" charset="0"/>
+                            </a:rPr>
+                            <m:t>𝑉</m:t>
+                          </m:r>
+                        </m:num>
+                        <m:den>
+                          <m:r>
+                            <a:rPr lang="en-US" sz="1400" i="1">
+                              <a:solidFill>
+                                <a:srgbClr val="002060"/>
+                              </a:solidFill>
+                              <a:latin typeface="Cambria Math" panose="02040503050406030204" pitchFamily="18" charset="0"/>
+                            </a:rPr>
+                            <m:t>𝐺𝐻𝑧</m:t>
+                          </m:r>
+                        </m:den>
+                      </m:f>
+                    </m:oMath>
+                  </m:oMathPara>
+                </a14:m>
+                <a:endParaRPr lang="en-US" sz="1400" dirty="0">
+                  <a:solidFill>
+                    <a:srgbClr val="002060"/>
+                  </a:solidFill>
+                </a:endParaRPr>
+              </a:p>
+            </p:txBody>
+          </p:sp>
+        </mc:Choice>
+        <mc:Fallback>
+          <p:sp>
+            <p:nvSpPr>
+              <p:cNvPr id="28" name="Rectangle: Rounded Corners 27">
+                <a:extLst>
+                  <a:ext uri="{FF2B5EF4-FFF2-40B4-BE49-F238E27FC236}">
+                    <a16:creationId xmlns:a16="http://schemas.microsoft.com/office/drawing/2014/main" id="{37148C56-95B5-0EBC-6170-8B83C71C6CE2}"/>
+                  </a:ext>
+                </a:extLst>
+              </p:cNvPr>
+              <p:cNvSpPr>
+                <a:spLocks noRot="1" noChangeAspect="1" noMove="1" noResize="1" noEditPoints="1" noAdjustHandles="1" noChangeArrowheads="1" noChangeShapeType="1" noTextEdit="1"/>
+              </p:cNvSpPr>
+              <p:nvPr/>
+            </p:nvSpPr>
+            <p:spPr>
+              <a:xfrm>
+                <a:off x="2351190" y="3361786"/>
+                <a:ext cx="2514600" cy="914400"/>
+              </a:xfrm>
+              <a:prstGeom prst="roundRect">
+                <a:avLst/>
+              </a:prstGeom>
+              <a:blipFill>
+                <a:blip r:embed="rId7"/>
+                <a:stretch>
+                  <a:fillRect/>
+                </a:stretch>
+              </a:blipFill>
+            </p:spPr>
+            <p:txBody>
+              <a:bodyPr/>
+              <a:lstStyle/>
+              <a:p>
+                <a:r>
+                  <a:rPr lang="en-US">
+                    <a:noFill/>
+                  </a:rPr>
+                  <a:t> </a:t>
+                </a:r>
+              </a:p>
+            </p:txBody>
+          </p:sp>
+        </mc:Fallback>
+      </mc:AlternateContent>
+      <mc:AlternateContent xmlns:mc="http://schemas.openxmlformats.org/markup-compatibility/2006">
+        <mc:Choice xmlns:a14="http://schemas.microsoft.com/office/drawing/2010/main" Requires="a14">
+          <p:sp>
+            <p:nvSpPr>
+              <p:cNvPr id="4" name="Rectangle: Rounded Corners 3">
+                <a:extLst>
+                  <a:ext uri="{FF2B5EF4-FFF2-40B4-BE49-F238E27FC236}">
+                    <a16:creationId xmlns:a16="http://schemas.microsoft.com/office/drawing/2014/main" id="{F32D8B7C-4CF0-BA78-5353-41A46AD10499}"/>
+                  </a:ext>
+                </a:extLst>
+              </p:cNvPr>
+              <p:cNvSpPr/>
+              <p:nvPr/>
+            </p:nvSpPr>
+            <p:spPr>
+              <a:xfrm>
+                <a:off x="3887386" y="815934"/>
+                <a:ext cx="2514600" cy="914400"/>
+              </a:xfrm>
+              <a:prstGeom prst="roundRect">
+                <a:avLst/>
+              </a:prstGeom>
+              <a:solidFill>
+                <a:srgbClr val="FFFF00"/>
+              </a:solidFill>
+            </p:spPr>
+            <p:style>
+              <a:lnRef idx="2">
+                <a:schemeClr val="accent1">
+                  <a:shade val="15000"/>
+                </a:schemeClr>
+              </a:lnRef>
+              <a:fillRef idx="1">
+                <a:schemeClr val="accent1"/>
+              </a:fillRef>
+              <a:effectRef idx="0">
+                <a:schemeClr val="accent1"/>
+              </a:effectRef>
+              <a:fontRef idx="minor">
+                <a:schemeClr val="lt1"/>
+              </a:fontRef>
+            </p:style>
+            <p:txBody>
+              <a:bodyPr rtlCol="0" anchor="ctr"/>
+              <a:lstStyle/>
+              <a:p>
+                <a:pPr algn="ctr"/>
+                <a14:m>
+                  <m:oMathPara xmlns:m="http://schemas.openxmlformats.org/officeDocument/2006/math">
+                    <m:oMathParaPr>
+                      <m:jc m:val="centerGroup"/>
+                    </m:oMathParaPr>
+                    <m:oMath xmlns:m="http://schemas.openxmlformats.org/officeDocument/2006/math">
+                      <m:r>
+                        <a:rPr lang="en-US" sz="1400" i="1" smtClean="0">
+                          <a:solidFill>
+                            <a:schemeClr val="tx1"/>
+                          </a:solidFill>
+                          <a:latin typeface="Cambria Math" panose="02040503050406030204" pitchFamily="18" charset="0"/>
+                        </a:rPr>
+                        <m:t>h</m:t>
+                      </m:r>
+                      <m:r>
+                        <a:rPr lang="en-US" sz="1400" i="1" smtClean="0">
+                          <a:solidFill>
+                            <a:schemeClr val="tx1"/>
+                          </a:solidFill>
+                          <a:latin typeface="Cambria Math" panose="02040503050406030204" pitchFamily="18" charset="0"/>
+                        </a:rPr>
+                        <m:t>=6.6</m:t>
+                      </m:r>
+                      <m:r>
+                        <a:rPr lang="en-US" sz="1400" i="1" smtClean="0">
+                          <a:solidFill>
+                            <a:schemeClr val="tx1"/>
+                          </a:solidFill>
+                          <a:latin typeface="Cambria Math" panose="02040503050406030204" pitchFamily="18" charset="0"/>
+                        </a:rPr>
+                        <m:t>3×</m:t>
+                      </m:r>
+                      <m:sSup>
+                        <m:sSupPr>
+                          <m:ctrlPr>
+                            <a:rPr lang="en-US" sz="1400" i="1">
+                              <a:solidFill>
+                                <a:srgbClr val="002060"/>
+                              </a:solidFill>
+                              <a:latin typeface="Cambria Math" panose="02040503050406030204" pitchFamily="18" charset="0"/>
+                              <a:ea typeface="Cambria Math" panose="02040503050406030204" pitchFamily="18" charset="0"/>
+                            </a:rPr>
+                          </m:ctrlPr>
+                        </m:sSupPr>
+                        <m:e>
+                          <m:r>
+                            <a:rPr lang="en-US" sz="1400" i="1">
+                              <a:solidFill>
+                                <a:srgbClr val="002060"/>
+                              </a:solidFill>
+                              <a:latin typeface="Cambria Math" panose="02040503050406030204" pitchFamily="18" charset="0"/>
+                              <a:ea typeface="Cambria Math" panose="02040503050406030204" pitchFamily="18" charset="0"/>
+                            </a:rPr>
+                            <m:t>10</m:t>
+                          </m:r>
+                        </m:e>
+                        <m:sup>
+                          <m:r>
+                            <a:rPr lang="en-US" sz="1400" i="1">
+                              <a:solidFill>
+                                <a:srgbClr val="002060"/>
+                              </a:solidFill>
+                              <a:latin typeface="Cambria Math" panose="02040503050406030204" pitchFamily="18" charset="0"/>
+                              <a:ea typeface="Cambria Math" panose="02040503050406030204" pitchFamily="18" charset="0"/>
+                            </a:rPr>
+                            <m:t>−</m:t>
+                          </m:r>
+                          <m:r>
+                            <a:rPr lang="en-US" sz="1400" b="0" i="1" smtClean="0">
+                              <a:solidFill>
+                                <a:srgbClr val="002060"/>
+                              </a:solidFill>
+                              <a:latin typeface="Cambria Math" panose="02040503050406030204" pitchFamily="18" charset="0"/>
+                              <a:ea typeface="Cambria Math" panose="02040503050406030204" pitchFamily="18" charset="0"/>
+                            </a:rPr>
+                            <m:t>1</m:t>
+                          </m:r>
+                        </m:sup>
+                      </m:sSup>
+                      <m:f>
+                        <m:fPr>
+                          <m:ctrlPr>
+                            <a:rPr lang="en-US" sz="1400" i="1">
+                              <a:solidFill>
+                                <a:schemeClr val="tx1"/>
+                              </a:solidFill>
+                              <a:latin typeface="Cambria Math" panose="02040503050406030204" pitchFamily="18" charset="0"/>
+                            </a:rPr>
+                          </m:ctrlPr>
+                        </m:fPr>
+                        <m:num>
+                          <m:r>
+                            <a:rPr lang="en-US" sz="1400" b="0" i="1" smtClean="0">
+                              <a:solidFill>
+                                <a:schemeClr val="tx1"/>
+                              </a:solidFill>
+                              <a:latin typeface="Cambria Math" panose="02040503050406030204" pitchFamily="18" charset="0"/>
+                            </a:rPr>
+                            <m:t>𝑓</m:t>
+                          </m:r>
+                          <m:r>
+                            <a:rPr lang="en-US" sz="1400" i="1">
+                              <a:solidFill>
+                                <a:schemeClr val="tx1"/>
+                              </a:solidFill>
+                              <a:latin typeface="Cambria Math" panose="02040503050406030204" pitchFamily="18" charset="0"/>
+                            </a:rPr>
+                            <m:t>𝑊</m:t>
+                          </m:r>
+                        </m:num>
+                        <m:den>
+                          <m:sSup>
+                            <m:sSupPr>
+                              <m:ctrlPr>
+                                <a:rPr lang="en-US" sz="1400" i="1">
+                                  <a:solidFill>
+                                    <a:schemeClr val="tx1"/>
+                                  </a:solidFill>
+                                  <a:latin typeface="Cambria Math" panose="02040503050406030204" pitchFamily="18" charset="0"/>
+                                </a:rPr>
+                              </m:ctrlPr>
+                            </m:sSupPr>
+                            <m:e>
+                              <m:r>
+                                <a:rPr lang="en-US" sz="1400" i="1">
+                                  <a:solidFill>
+                                    <a:schemeClr val="tx1"/>
+                                  </a:solidFill>
+                                  <a:latin typeface="Cambria Math" panose="02040503050406030204" pitchFamily="18" charset="0"/>
+                                </a:rPr>
+                                <m:t>𝐺𝐻𝑧</m:t>
+                              </m:r>
+                            </m:e>
+                            <m:sup>
+                              <m:r>
+                                <a:rPr lang="en-US" sz="1400" i="1">
+                                  <a:solidFill>
+                                    <a:schemeClr val="tx1"/>
+                                  </a:solidFill>
+                                  <a:latin typeface="Cambria Math" panose="02040503050406030204" pitchFamily="18" charset="0"/>
+                                </a:rPr>
+                                <m:t>2</m:t>
+                              </m:r>
+                            </m:sup>
+                          </m:sSup>
+                        </m:den>
+                      </m:f>
+                    </m:oMath>
+                  </m:oMathPara>
+                </a14:m>
+                <a:endParaRPr lang="en-US" sz="1400" dirty="0">
+                  <a:solidFill>
+                    <a:schemeClr val="tx1"/>
+                  </a:solidFill>
+                </a:endParaRPr>
+              </a:p>
+            </p:txBody>
+          </p:sp>
+        </mc:Choice>
+        <mc:Fallback>
+          <p:sp>
+            <p:nvSpPr>
+              <p:cNvPr id="4" name="Rectangle: Rounded Corners 3">
+                <a:extLst>
+                  <a:ext uri="{FF2B5EF4-FFF2-40B4-BE49-F238E27FC236}">
+                    <a16:creationId xmlns:a16="http://schemas.microsoft.com/office/drawing/2014/main" id="{F32D8B7C-4CF0-BA78-5353-41A46AD10499}"/>
+                  </a:ext>
+                </a:extLst>
+              </p:cNvPr>
+              <p:cNvSpPr>
+                <a:spLocks noRot="1" noChangeAspect="1" noMove="1" noResize="1" noEditPoints="1" noAdjustHandles="1" noChangeArrowheads="1" noChangeShapeType="1" noTextEdit="1"/>
+              </p:cNvSpPr>
+              <p:nvPr/>
+            </p:nvSpPr>
+            <p:spPr>
+              <a:xfrm>
+                <a:off x="3887386" y="815934"/>
+                <a:ext cx="2514600" cy="914400"/>
+              </a:xfrm>
+              <a:prstGeom prst="roundRect">
+                <a:avLst/>
+              </a:prstGeom>
+              <a:blipFill>
+                <a:blip r:embed="rId8"/>
+                <a:stretch>
+                  <a:fillRect/>
+                </a:stretch>
+              </a:blipFill>
+            </p:spPr>
+            <p:txBody>
+              <a:bodyPr/>
+              <a:lstStyle/>
+              <a:p>
+                <a:r>
+                  <a:rPr lang="en-US">
+                    <a:noFill/>
+                  </a:rPr>
+                  <a:t> </a:t>
+                </a:r>
+              </a:p>
+            </p:txBody>
+          </p:sp>
+        </mc:Fallback>
+      </mc:AlternateContent>
+      <mc:AlternateContent xmlns:mc="http://schemas.openxmlformats.org/markup-compatibility/2006">
+        <mc:Choice xmlns:a14="http://schemas.microsoft.com/office/drawing/2010/main" Requires="a14">
+          <p:sp>
+            <p:nvSpPr>
+              <p:cNvPr id="9" name="Rectangle: Rounded Corners 8">
+                <a:extLst>
+                  <a:ext uri="{FF2B5EF4-FFF2-40B4-BE49-F238E27FC236}">
+                    <a16:creationId xmlns:a16="http://schemas.microsoft.com/office/drawing/2014/main" id="{41F32D43-5514-1899-7D1D-98BF7A1FFACB}"/>
+                  </a:ext>
+                </a:extLst>
+              </p:cNvPr>
+              <p:cNvSpPr/>
+              <p:nvPr/>
+            </p:nvSpPr>
+            <p:spPr>
+              <a:xfrm>
+                <a:off x="977237" y="930234"/>
+                <a:ext cx="2011680" cy="685800"/>
+              </a:xfrm>
+              <a:prstGeom prst="roundRect">
+                <a:avLst/>
+              </a:prstGeom>
+              <a:solidFill>
+                <a:schemeClr val="tx1">
+                  <a:lumMod val="75000"/>
+                  <a:lumOff val="25000"/>
+                </a:schemeClr>
+              </a:solidFill>
+            </p:spPr>
+            <p:style>
+              <a:lnRef idx="2">
+                <a:schemeClr val="accent1">
+                  <a:shade val="15000"/>
+                </a:schemeClr>
+              </a:lnRef>
+              <a:fillRef idx="1">
+                <a:schemeClr val="accent1"/>
+              </a:fillRef>
+              <a:effectRef idx="0">
+                <a:schemeClr val="accent1"/>
+              </a:effectRef>
+              <a:fontRef idx="minor">
+                <a:schemeClr val="lt1"/>
+              </a:fontRef>
+            </p:style>
+            <p:txBody>
+              <a:bodyPr rtlCol="0" anchor="ctr"/>
+              <a:lstStyle/>
+              <a:p>
+                <a:pPr algn="ctr"/>
+                <a14:m>
+                  <m:oMathPara xmlns:m="http://schemas.openxmlformats.org/officeDocument/2006/math">
+                    <m:oMathParaPr>
+                      <m:jc m:val="centerGroup"/>
+                    </m:oMathParaPr>
+                    <m:oMath xmlns:m="http://schemas.openxmlformats.org/officeDocument/2006/math">
+                      <m:r>
+                        <a:rPr lang="en-US" sz="1400" smtClean="0">
+                          <a:solidFill>
+                            <a:schemeClr val="bg1"/>
+                          </a:solidFill>
+                          <a:latin typeface="Cambria Math" panose="02040503050406030204" pitchFamily="18" charset="0"/>
+                        </a:rPr>
+                        <m:t>1 </m:t>
+                      </m:r>
+                      <m:r>
+                        <m:rPr>
+                          <m:sty m:val="p"/>
+                        </m:rPr>
+                        <a:rPr lang="en-US" sz="1400" smtClean="0">
+                          <a:solidFill>
+                            <a:schemeClr val="bg1"/>
+                          </a:solidFill>
+                          <a:latin typeface="Cambria Math" panose="02040503050406030204" pitchFamily="18" charset="0"/>
+                        </a:rPr>
+                        <m:t>C</m:t>
+                      </m:r>
+                      <m:r>
+                        <a:rPr lang="en-US" sz="1400" smtClean="0">
+                          <a:solidFill>
+                            <a:schemeClr val="bg1"/>
+                          </a:solidFill>
+                          <a:latin typeface="Cambria Math" panose="02040503050406030204" pitchFamily="18" charset="0"/>
+                        </a:rPr>
+                        <m:t>=</m:t>
+                      </m:r>
+                      <m:sSup>
+                        <m:sSupPr>
+                          <m:ctrlPr>
+                            <a:rPr lang="en-US" sz="1400" i="1">
+                              <a:solidFill>
+                                <a:schemeClr val="bg1"/>
+                              </a:solidFill>
+                              <a:latin typeface="Cambria Math" panose="02040503050406030204" pitchFamily="18" charset="0"/>
+                            </a:rPr>
+                          </m:ctrlPr>
+                        </m:sSupPr>
+                        <m:e>
+                          <m:r>
+                            <a:rPr lang="en-US" sz="1400" i="1">
+                              <a:solidFill>
+                                <a:schemeClr val="bg1"/>
+                              </a:solidFill>
+                              <a:latin typeface="Cambria Math" panose="02040503050406030204" pitchFamily="18" charset="0"/>
+                            </a:rPr>
+                            <m:t>10</m:t>
+                          </m:r>
+                        </m:e>
+                        <m:sup>
+                          <m:r>
+                            <a:rPr lang="en-US" sz="1400" i="1">
+                              <a:solidFill>
+                                <a:schemeClr val="bg1"/>
+                              </a:solidFill>
+                              <a:latin typeface="Cambria Math" panose="02040503050406030204" pitchFamily="18" charset="0"/>
+                            </a:rPr>
+                            <m:t>21</m:t>
+                          </m:r>
+                        </m:sup>
+                      </m:sSup>
+                      <m:f>
+                        <m:fPr>
+                          <m:ctrlPr>
+                            <a:rPr lang="en-US" sz="1400" i="1">
+                              <a:solidFill>
+                                <a:schemeClr val="bg1"/>
+                              </a:solidFill>
+                              <a:latin typeface="Cambria Math" panose="02040503050406030204" pitchFamily="18" charset="0"/>
+                            </a:rPr>
+                          </m:ctrlPr>
+                        </m:fPr>
+                        <m:num>
+                          <m:r>
+                            <a:rPr lang="en-US" sz="1400" b="0" i="1" smtClean="0">
+                              <a:solidFill>
+                                <a:schemeClr val="bg1"/>
+                              </a:solidFill>
+                              <a:latin typeface="Cambria Math" panose="02040503050406030204" pitchFamily="18" charset="0"/>
+                            </a:rPr>
+                            <m:t>𝑓</m:t>
+                          </m:r>
+                          <m:r>
+                            <a:rPr lang="en-US" sz="1400" i="1">
+                              <a:solidFill>
+                                <a:schemeClr val="bg1"/>
+                              </a:solidFill>
+                              <a:latin typeface="Cambria Math" panose="02040503050406030204" pitchFamily="18" charset="0"/>
+                            </a:rPr>
+                            <m:t>𝑊</m:t>
+                          </m:r>
+                        </m:num>
+                        <m:den>
+                          <m:r>
+                            <a:rPr lang="en-US" sz="1400" i="1">
+                              <a:solidFill>
+                                <a:schemeClr val="bg1"/>
+                              </a:solidFill>
+                              <a:latin typeface="Cambria Math" panose="02040503050406030204" pitchFamily="18" charset="0"/>
+                            </a:rPr>
+                            <m:t>𝐺𝐻𝑧</m:t>
+                          </m:r>
+                          <m:r>
+                            <a:rPr lang="en-US" sz="1400" i="1">
+                              <a:solidFill>
+                                <a:schemeClr val="bg1"/>
+                              </a:solidFill>
+                              <a:latin typeface="Cambria Math" panose="02040503050406030204" pitchFamily="18" charset="0"/>
+                              <a:ea typeface="Cambria Math" panose="02040503050406030204" pitchFamily="18" charset="0"/>
+                            </a:rPr>
+                            <m:t>∙</m:t>
+                          </m:r>
+                          <m:r>
+                            <a:rPr lang="en-US" sz="1400" b="0" i="1" smtClean="0">
+                              <a:solidFill>
+                                <a:schemeClr val="bg1"/>
+                              </a:solidFill>
+                              <a:latin typeface="Cambria Math" panose="02040503050406030204" pitchFamily="18" charset="0"/>
+                              <a:ea typeface="Cambria Math" panose="02040503050406030204" pitchFamily="18" charset="0"/>
+                            </a:rPr>
+                            <m:t>𝑚</m:t>
+                          </m:r>
+                          <m:r>
+                            <a:rPr lang="en-US" sz="1400" i="1">
+                              <a:solidFill>
+                                <a:schemeClr val="bg1"/>
+                              </a:solidFill>
+                              <a:latin typeface="Cambria Math" panose="02040503050406030204" pitchFamily="18" charset="0"/>
+                              <a:ea typeface="Cambria Math" panose="02040503050406030204" pitchFamily="18" charset="0"/>
+                            </a:rPr>
+                            <m:t>𝑉</m:t>
+                          </m:r>
+                        </m:den>
+                      </m:f>
+                    </m:oMath>
+                  </m:oMathPara>
+                </a14:m>
+                <a:endParaRPr lang="en-US" sz="1400" dirty="0">
+                  <a:solidFill>
+                    <a:schemeClr val="bg1"/>
+                  </a:solidFill>
+                </a:endParaRPr>
+              </a:p>
+            </p:txBody>
+          </p:sp>
+        </mc:Choice>
+        <mc:Fallback>
+          <p:sp>
+            <p:nvSpPr>
+              <p:cNvPr id="9" name="Rectangle: Rounded Corners 8">
+                <a:extLst>
+                  <a:ext uri="{FF2B5EF4-FFF2-40B4-BE49-F238E27FC236}">
+                    <a16:creationId xmlns:a16="http://schemas.microsoft.com/office/drawing/2014/main" id="{41F32D43-5514-1899-7D1D-98BF7A1FFACB}"/>
+                  </a:ext>
+                </a:extLst>
+              </p:cNvPr>
+              <p:cNvSpPr>
+                <a:spLocks noRot="1" noChangeAspect="1" noMove="1" noResize="1" noEditPoints="1" noAdjustHandles="1" noChangeArrowheads="1" noChangeShapeType="1" noTextEdit="1"/>
+              </p:cNvSpPr>
+              <p:nvPr/>
+            </p:nvSpPr>
+            <p:spPr>
+              <a:xfrm>
+                <a:off x="977237" y="930234"/>
+                <a:ext cx="2011680" cy="685800"/>
+              </a:xfrm>
+              <a:prstGeom prst="roundRect">
+                <a:avLst/>
+              </a:prstGeom>
+              <a:blipFill>
+                <a:blip r:embed="rId9"/>
+                <a:stretch>
+                  <a:fillRect/>
+                </a:stretch>
+              </a:blipFill>
+            </p:spPr>
+            <p:txBody>
+              <a:bodyPr/>
+              <a:lstStyle/>
+              <a:p>
+                <a:r>
+                  <a:rPr lang="en-US">
+                    <a:noFill/>
+                  </a:rPr>
+                  <a:t> </a:t>
+                </a:r>
+              </a:p>
+            </p:txBody>
+          </p:sp>
+        </mc:Fallback>
+      </mc:AlternateContent>
+      <mc:AlternateContent xmlns:mc="http://schemas.openxmlformats.org/markup-compatibility/2006">
+        <mc:Choice xmlns:a14="http://schemas.microsoft.com/office/drawing/2010/main" Requires="a14">
+          <p:sp>
+            <p:nvSpPr>
+              <p:cNvPr id="10" name="Rectangle: Rounded Corners 9">
+                <a:extLst>
+                  <a:ext uri="{FF2B5EF4-FFF2-40B4-BE49-F238E27FC236}">
+                    <a16:creationId xmlns:a16="http://schemas.microsoft.com/office/drawing/2014/main" id="{A04394F7-7858-4F40-8A74-A23DA02D02E4}"/>
+                  </a:ext>
+                </a:extLst>
+              </p:cNvPr>
+              <p:cNvSpPr/>
+              <p:nvPr/>
+            </p:nvSpPr>
+            <p:spPr>
+              <a:xfrm>
+                <a:off x="7430961" y="930234"/>
+                <a:ext cx="2011680" cy="685800"/>
+              </a:xfrm>
+              <a:prstGeom prst="roundRect">
+                <a:avLst/>
+              </a:prstGeom>
+              <a:solidFill>
+                <a:schemeClr val="tx1">
+                  <a:lumMod val="75000"/>
+                  <a:lumOff val="25000"/>
+                </a:schemeClr>
+              </a:solidFill>
+            </p:spPr>
+            <p:style>
+              <a:lnRef idx="2">
+                <a:schemeClr val="accent1">
+                  <a:shade val="15000"/>
+                </a:schemeClr>
+              </a:lnRef>
+              <a:fillRef idx="1">
+                <a:schemeClr val="accent1"/>
+              </a:fillRef>
+              <a:effectRef idx="0">
+                <a:schemeClr val="accent1"/>
+              </a:effectRef>
+              <a:fontRef idx="minor">
+                <a:schemeClr val="lt1"/>
+              </a:fontRef>
+            </p:style>
+            <p:txBody>
+              <a:bodyPr rtlCol="0" anchor="ctr"/>
+              <a:lstStyle/>
+              <a:p>
+                <a:pPr algn="ctr"/>
+                <a14:m>
+                  <m:oMathPara xmlns:m="http://schemas.openxmlformats.org/officeDocument/2006/math">
+                    <m:oMathParaPr>
+                      <m:jc m:val="centerGroup"/>
+                    </m:oMathParaPr>
+                    <m:oMath xmlns:m="http://schemas.openxmlformats.org/officeDocument/2006/math">
+                      <m:r>
+                        <a:rPr lang="en-US" sz="1400" smtClean="0">
+                          <a:solidFill>
+                            <a:schemeClr val="bg1"/>
+                          </a:solidFill>
+                          <a:latin typeface="Cambria Math" panose="02040503050406030204" pitchFamily="18" charset="0"/>
+                        </a:rPr>
+                        <m:t>1 </m:t>
+                      </m:r>
+                      <m:r>
+                        <m:rPr>
+                          <m:sty m:val="p"/>
+                        </m:rPr>
+                        <a:rPr lang="en-US" sz="1400" smtClean="0">
+                          <a:solidFill>
+                            <a:schemeClr val="bg1"/>
+                          </a:solidFill>
+                          <a:latin typeface="Cambria Math" panose="02040503050406030204" pitchFamily="18" charset="0"/>
+                        </a:rPr>
+                        <m:t>J</m:t>
+                      </m:r>
+                      <m:r>
+                        <a:rPr lang="en-US" sz="1400" i="1">
+                          <a:solidFill>
+                            <a:schemeClr val="bg1"/>
+                          </a:solidFill>
+                          <a:latin typeface="Cambria Math" panose="02040503050406030204" pitchFamily="18" charset="0"/>
+                          <a:ea typeface="Cambria Math" panose="02040503050406030204" pitchFamily="18" charset="0"/>
+                        </a:rPr>
+                        <m:t>∙</m:t>
+                      </m:r>
+                      <m:r>
+                        <m:rPr>
+                          <m:sty m:val="p"/>
+                        </m:rPr>
+                        <a:rPr lang="en-US" sz="1400">
+                          <a:solidFill>
+                            <a:schemeClr val="bg1"/>
+                          </a:solidFill>
+                          <a:latin typeface="Cambria Math" panose="02040503050406030204" pitchFamily="18" charset="0"/>
+                          <a:ea typeface="Cambria Math" panose="02040503050406030204" pitchFamily="18" charset="0"/>
+                        </a:rPr>
+                        <m:t>s</m:t>
+                      </m:r>
+                      <m:r>
+                        <a:rPr lang="en-US" sz="1400">
+                          <a:solidFill>
+                            <a:schemeClr val="bg1"/>
+                          </a:solidFill>
+                          <a:latin typeface="Cambria Math" panose="02040503050406030204" pitchFamily="18" charset="0"/>
+                        </a:rPr>
+                        <m:t>=</m:t>
+                      </m:r>
+                      <m:sSup>
+                        <m:sSupPr>
+                          <m:ctrlPr>
+                            <a:rPr lang="en-US" sz="1400" i="1">
+                              <a:solidFill>
+                                <a:schemeClr val="bg1"/>
+                              </a:solidFill>
+                              <a:latin typeface="Cambria Math" panose="02040503050406030204" pitchFamily="18" charset="0"/>
+                            </a:rPr>
+                          </m:ctrlPr>
+                        </m:sSupPr>
+                        <m:e>
+                          <m:r>
+                            <a:rPr lang="en-US" sz="1400" i="1">
+                              <a:solidFill>
+                                <a:schemeClr val="bg1"/>
+                              </a:solidFill>
+                              <a:latin typeface="Cambria Math" panose="02040503050406030204" pitchFamily="18" charset="0"/>
+                            </a:rPr>
+                            <m:t>10</m:t>
+                          </m:r>
+                        </m:e>
+                        <m:sup>
+                          <m:r>
+                            <a:rPr lang="en-US" sz="1400" i="1">
+                              <a:solidFill>
+                                <a:schemeClr val="bg1"/>
+                              </a:solidFill>
+                              <a:latin typeface="Cambria Math" panose="02040503050406030204" pitchFamily="18" charset="0"/>
+                            </a:rPr>
+                            <m:t>3</m:t>
+                          </m:r>
+                          <m:r>
+                            <a:rPr lang="en-US" sz="1400" b="0" i="1" smtClean="0">
+                              <a:solidFill>
+                                <a:schemeClr val="bg1"/>
+                              </a:solidFill>
+                              <a:latin typeface="Cambria Math" panose="02040503050406030204" pitchFamily="18" charset="0"/>
+                            </a:rPr>
+                            <m:t>3</m:t>
+                          </m:r>
+                        </m:sup>
+                      </m:sSup>
+                      <m:f>
+                        <m:fPr>
+                          <m:ctrlPr>
+                            <a:rPr lang="en-US" sz="1400" i="1">
+                              <a:solidFill>
+                                <a:schemeClr val="bg1"/>
+                              </a:solidFill>
+                              <a:latin typeface="Cambria Math" panose="02040503050406030204" pitchFamily="18" charset="0"/>
+                            </a:rPr>
+                          </m:ctrlPr>
+                        </m:fPr>
+                        <m:num>
+                          <m:r>
+                            <a:rPr lang="en-US" sz="1400" b="0" i="1" smtClean="0">
+                              <a:solidFill>
+                                <a:schemeClr val="bg1"/>
+                              </a:solidFill>
+                              <a:latin typeface="Cambria Math" panose="02040503050406030204" pitchFamily="18" charset="0"/>
+                            </a:rPr>
+                            <m:t>𝑓</m:t>
+                          </m:r>
+                          <m:r>
+                            <a:rPr lang="en-US" sz="1400" i="1">
+                              <a:solidFill>
+                                <a:schemeClr val="bg1"/>
+                              </a:solidFill>
+                              <a:latin typeface="Cambria Math" panose="02040503050406030204" pitchFamily="18" charset="0"/>
+                            </a:rPr>
+                            <m:t>𝑊</m:t>
+                          </m:r>
+                        </m:num>
+                        <m:den>
+                          <m:sSup>
+                            <m:sSupPr>
+                              <m:ctrlPr>
+                                <a:rPr lang="en-US" sz="1400" i="1">
+                                  <a:solidFill>
+                                    <a:schemeClr val="bg1"/>
+                                  </a:solidFill>
+                                  <a:latin typeface="Cambria Math" panose="02040503050406030204" pitchFamily="18" charset="0"/>
+                                </a:rPr>
+                              </m:ctrlPr>
+                            </m:sSupPr>
+                            <m:e>
+                              <m:r>
+                                <a:rPr lang="en-US" sz="1400" i="1">
+                                  <a:solidFill>
+                                    <a:schemeClr val="bg1"/>
+                                  </a:solidFill>
+                                  <a:latin typeface="Cambria Math" panose="02040503050406030204" pitchFamily="18" charset="0"/>
+                                </a:rPr>
+                                <m:t>𝐺𝐻𝑧</m:t>
+                              </m:r>
+                            </m:e>
+                            <m:sup>
+                              <m:r>
+                                <a:rPr lang="en-US" sz="1400" i="1">
+                                  <a:solidFill>
+                                    <a:schemeClr val="bg1"/>
+                                  </a:solidFill>
+                                  <a:latin typeface="Cambria Math" panose="02040503050406030204" pitchFamily="18" charset="0"/>
+                                </a:rPr>
+                                <m:t>2</m:t>
+                              </m:r>
+                            </m:sup>
+                          </m:sSup>
+                        </m:den>
+                      </m:f>
+                    </m:oMath>
+                  </m:oMathPara>
+                </a14:m>
+                <a:endParaRPr lang="en-US" sz="1400" dirty="0">
+                  <a:solidFill>
+                    <a:schemeClr val="bg1"/>
+                  </a:solidFill>
+                </a:endParaRPr>
+              </a:p>
+            </p:txBody>
+          </p:sp>
+        </mc:Choice>
+        <mc:Fallback>
+          <p:sp>
+            <p:nvSpPr>
+              <p:cNvPr id="10" name="Rectangle: Rounded Corners 9">
+                <a:extLst>
+                  <a:ext uri="{FF2B5EF4-FFF2-40B4-BE49-F238E27FC236}">
+                    <a16:creationId xmlns:a16="http://schemas.microsoft.com/office/drawing/2014/main" id="{A04394F7-7858-4F40-8A74-A23DA02D02E4}"/>
+                  </a:ext>
+                </a:extLst>
+              </p:cNvPr>
+              <p:cNvSpPr>
+                <a:spLocks noRot="1" noChangeAspect="1" noMove="1" noResize="1" noEditPoints="1" noAdjustHandles="1" noChangeArrowheads="1" noChangeShapeType="1" noTextEdit="1"/>
+              </p:cNvSpPr>
+              <p:nvPr/>
+            </p:nvSpPr>
+            <p:spPr>
+              <a:xfrm>
+                <a:off x="7430961" y="930234"/>
+                <a:ext cx="2011680" cy="685800"/>
+              </a:xfrm>
+              <a:prstGeom prst="roundRect">
+                <a:avLst/>
+              </a:prstGeom>
+              <a:blipFill>
+                <a:blip r:embed="rId10"/>
+                <a:stretch>
+                  <a:fillRect/>
+                </a:stretch>
+              </a:blipFill>
+            </p:spPr>
+            <p:txBody>
+              <a:bodyPr/>
+              <a:lstStyle/>
+              <a:p>
+                <a:r>
+                  <a:rPr lang="en-US">
+                    <a:noFill/>
+                  </a:rPr>
+                  <a:t> </a:t>
+                </a:r>
+              </a:p>
+            </p:txBody>
+          </p:sp>
+        </mc:Fallback>
+      </mc:AlternateContent>
+      <p:sp>
+        <p:nvSpPr>
+          <p:cNvPr id="11" name="TextBox 10">
+            <a:extLst>
+              <a:ext uri="{FF2B5EF4-FFF2-40B4-BE49-F238E27FC236}">
+                <a16:creationId xmlns:a16="http://schemas.microsoft.com/office/drawing/2014/main" id="{E1B66234-55C6-CA59-1A9C-59A8EC0DB030}"/>
+              </a:ext>
+            </a:extLst>
+          </p:cNvPr>
+          <p:cNvSpPr txBox="1"/>
+          <p:nvPr/>
+        </p:nvSpPr>
+        <p:spPr>
+          <a:xfrm>
+            <a:off x="-3025" y="7127787"/>
+            <a:ext cx="2019992" cy="646331"/>
+          </a:xfrm>
+          <a:prstGeom prst="rect">
+            <a:avLst/>
+          </a:prstGeom>
+          <a:noFill/>
+        </p:spPr>
+        <p:txBody>
+          <a:bodyPr wrap="square" rtlCol="0">
+            <a:spAutoFit/>
+          </a:bodyPr>
+          <a:lstStyle/>
+          <a:p>
+            <a:pPr algn="ctr"/>
+            <a:r>
+              <a:rPr lang="en-US" dirty="0"/>
+              <a:t>Frequency</a:t>
+            </a:r>
+          </a:p>
+          <a:p>
+            <a:pPr algn="ctr"/>
+            <a:r>
+              <a:rPr lang="en-US" dirty="0"/>
+              <a:t>GHz</a:t>
+            </a:r>
+          </a:p>
+        </p:txBody>
+      </p:sp>
+      <p:sp>
+        <p:nvSpPr>
+          <p:cNvPr id="12" name="TextBox 11">
+            <a:extLst>
+              <a:ext uri="{FF2B5EF4-FFF2-40B4-BE49-F238E27FC236}">
+                <a16:creationId xmlns:a16="http://schemas.microsoft.com/office/drawing/2014/main" id="{E2023F90-77D1-39E7-5F05-BC156334999D}"/>
+              </a:ext>
+            </a:extLst>
+          </p:cNvPr>
+          <p:cNvSpPr txBox="1"/>
+          <p:nvPr/>
+        </p:nvSpPr>
+        <p:spPr>
+          <a:xfrm>
+            <a:off x="2453792" y="7127787"/>
+            <a:ext cx="2019992" cy="646331"/>
+          </a:xfrm>
+          <a:prstGeom prst="rect">
+            <a:avLst/>
+          </a:prstGeom>
+          <a:noFill/>
+        </p:spPr>
+        <p:txBody>
+          <a:bodyPr wrap="square" rtlCol="0">
+            <a:spAutoFit/>
+          </a:bodyPr>
+          <a:lstStyle/>
+          <a:p>
+            <a:pPr algn="ctr"/>
+            <a:r>
+              <a:rPr lang="en-US" dirty="0"/>
+              <a:t>Voltage</a:t>
+            </a:r>
+          </a:p>
+          <a:p>
+            <a:pPr algn="ctr"/>
+            <a:r>
+              <a:rPr lang="en-US" dirty="0"/>
+              <a:t>mV</a:t>
+            </a:r>
+          </a:p>
+        </p:txBody>
+      </p:sp>
+      <p:sp>
+        <p:nvSpPr>
+          <p:cNvPr id="13" name="TextBox 12">
+            <a:extLst>
+              <a:ext uri="{FF2B5EF4-FFF2-40B4-BE49-F238E27FC236}">
+                <a16:creationId xmlns:a16="http://schemas.microsoft.com/office/drawing/2014/main" id="{6482B462-6C0C-61E0-4666-7E71F6A7BD7B}"/>
+              </a:ext>
+            </a:extLst>
+          </p:cNvPr>
+          <p:cNvSpPr txBox="1"/>
+          <p:nvPr/>
+        </p:nvSpPr>
+        <p:spPr>
+          <a:xfrm>
+            <a:off x="5451372" y="7127787"/>
+            <a:ext cx="2019992" cy="646331"/>
+          </a:xfrm>
+          <a:prstGeom prst="rect">
+            <a:avLst/>
+          </a:prstGeom>
+          <a:noFill/>
+        </p:spPr>
+        <p:txBody>
+          <a:bodyPr wrap="square" rtlCol="0">
+            <a:spAutoFit/>
+          </a:bodyPr>
+          <a:lstStyle/>
+          <a:p>
+            <a:pPr algn="ctr"/>
+            <a:r>
+              <a:rPr lang="en-US" dirty="0"/>
+              <a:t>Power</a:t>
+            </a:r>
+          </a:p>
+          <a:p>
+            <a:pPr algn="ctr"/>
+            <a:r>
+              <a:rPr lang="en-US" dirty="0"/>
+              <a:t>fW</a:t>
+            </a:r>
+          </a:p>
+        </p:txBody>
+      </p:sp>
+      <p:sp>
+        <p:nvSpPr>
+          <p:cNvPr id="14" name="TextBox 13">
+            <a:extLst>
+              <a:ext uri="{FF2B5EF4-FFF2-40B4-BE49-F238E27FC236}">
+                <a16:creationId xmlns:a16="http://schemas.microsoft.com/office/drawing/2014/main" id="{CF67EA5C-D441-2D53-BE8C-2B6DE695ABD0}"/>
+              </a:ext>
+            </a:extLst>
+          </p:cNvPr>
+          <p:cNvSpPr txBox="1"/>
+          <p:nvPr/>
+        </p:nvSpPr>
+        <p:spPr>
+          <a:xfrm>
+            <a:off x="7891624" y="7127787"/>
+            <a:ext cx="2019992" cy="646331"/>
+          </a:xfrm>
+          <a:prstGeom prst="rect">
+            <a:avLst/>
+          </a:prstGeom>
+          <a:noFill/>
+        </p:spPr>
+        <p:txBody>
+          <a:bodyPr wrap="square" rtlCol="0">
+            <a:spAutoFit/>
+          </a:bodyPr>
+          <a:lstStyle/>
+          <a:p>
+            <a:pPr algn="ctr"/>
+            <a:r>
+              <a:rPr lang="en-US" dirty="0"/>
+              <a:t>Temperature</a:t>
+            </a:r>
+          </a:p>
+          <a:p>
+            <a:pPr algn="ctr"/>
+            <a:r>
+              <a:rPr lang="en-US" dirty="0"/>
+              <a:t>mK</a:t>
+            </a:r>
+          </a:p>
+        </p:txBody>
+      </p:sp>
+    </p:spTree>
+    <p:extLst>
+      <p:ext uri="{BB962C8B-B14F-4D97-AF65-F5344CB8AC3E}">
+        <p14:creationId xmlns:p14="http://schemas.microsoft.com/office/powerpoint/2010/main" val="852898358"/>
       </p:ext>
     </p:extLst>
   </p:cSld>

</xml_diff>